<commit_message>
Update slides titles and add slides numbers
</commit_message>
<xml_diff>
--- a/slides/pptx/2-data-collection.pptx
+++ b/slides/pptx/2-data-collection.pptx
@@ -1,6 +1,6 @@
 
 <file path=ppt/presentation.xml><?xml version="1.0" encoding="utf-8"?>
-<p:presentation xmlns:a="http://schemas.openxmlformats.org/drawingml/2006/main" xmlns:r="http://schemas.openxmlformats.org/officeDocument/2006/relationships" xmlns:p="http://schemas.openxmlformats.org/presentationml/2006/main" saveSubsetFonts="1">
+<p:presentation xmlns:a="http://schemas.openxmlformats.org/drawingml/2006/main" xmlns:r="http://schemas.openxmlformats.org/officeDocument/2006/relationships" xmlns:p="http://schemas.openxmlformats.org/presentationml/2006/main" showSpecialPlsOnTitleSld="0" saveSubsetFonts="1">
   <p:sldMasterIdLst>
     <p:sldMasterId id="2147483660" r:id="rId1"/>
   </p:sldMasterIdLst>
@@ -229,7 +229,7 @@
           <a:p>
             <a:fld id="{BE1256C8-1BA4-4200-90F3-9413893DDEA5}" type="datetimeFigureOut">
               <a:rPr lang="en-US" smtClean="0"/>
-              <a:t>4/19/2018</a:t>
+              <a:t>4/20/2018</a:t>
             </a:fld>
             <a:endParaRPr lang="en-US"/>
           </a:p>
@@ -540,10 +540,7 @@
           <a:bodyPr/>
           <a:lstStyle/>
           <a:p>
-            <a:r>
-              <a:rPr lang="en-GB" dirty="0"/>
-              <a:t>Source: https://techcrunch.com/2017/06/27/facebook-2-billion-users/</a:t>
-            </a:r>
+            <a:endParaRPr lang="en-GB"/>
           </a:p>
         </p:txBody>
       </p:sp>
@@ -562,18 +559,18 @@
           <a:bodyPr/>
           <a:lstStyle/>
           <a:p>
-            <a:fld id="{1FCF5342-079E-44A6-ABEB-0241FE63E21A}" type="slidenum">
-              <a:rPr lang="en-GB" smtClean="0"/>
-              <a:t>4</a:t>
+            <a:fld id="{9D3E0FAC-92B7-4344-B8CE-D78B9752AB0B}" type="slidenum">
+              <a:rPr lang="en-US" smtClean="0"/>
+              <a:t>1</a:t>
             </a:fld>
-            <a:endParaRPr lang="en-GB"/>
+            <a:endParaRPr lang="en-US"/>
           </a:p>
         </p:txBody>
       </p:sp>
     </p:spTree>
     <p:extLst>
       <p:ext uri="{BB962C8B-B14F-4D97-AF65-F5344CB8AC3E}">
-        <p14:creationId xmlns:p14="http://schemas.microsoft.com/office/powerpoint/2010/main" val="1124136494"/>
+        <p14:creationId xmlns:p14="http://schemas.microsoft.com/office/powerpoint/2010/main" val="1526710917"/>
       </p:ext>
     </p:extLst>
   </p:cSld>
@@ -629,23 +626,7 @@
           <a:p>
             <a:r>
               <a:rPr lang="en-GB" dirty="0"/>
-              <a:t>Discuss availability, </a:t>
-            </a:r>
-            <a:r>
-              <a:rPr lang="en-GB" dirty="0" err="1"/>
-              <a:t>api</a:t>
-            </a:r>
-            <a:r>
-              <a:rPr lang="en-GB" dirty="0"/>
-              <a:t> </a:t>
-            </a:r>
-            <a:r>
-              <a:rPr lang="en-GB" dirty="0" err="1"/>
-              <a:t>etc</a:t>
-            </a:r>
-            <a:r>
-              <a:rPr lang="en-GB" dirty="0"/>
-              <a:t>… for each</a:t>
+              <a:t>Source: https://techcrunch.com/2017/06/27/facebook-2-billion-users/</a:t>
             </a:r>
           </a:p>
         </p:txBody>
@@ -667,7 +648,7 @@
           <a:p>
             <a:fld id="{1FCF5342-079E-44A6-ABEB-0241FE63E21A}" type="slidenum">
               <a:rPr lang="en-GB" smtClean="0"/>
-              <a:t>5</a:t>
+              <a:t>4</a:t>
             </a:fld>
             <a:endParaRPr lang="en-GB"/>
           </a:p>
@@ -676,7 +657,7 @@
     </p:spTree>
     <p:extLst>
       <p:ext uri="{BB962C8B-B14F-4D97-AF65-F5344CB8AC3E}">
-        <p14:creationId xmlns:p14="http://schemas.microsoft.com/office/powerpoint/2010/main" val="2518031338"/>
+        <p14:creationId xmlns:p14="http://schemas.microsoft.com/office/powerpoint/2010/main" val="1124136494"/>
       </p:ext>
     </p:extLst>
   </p:cSld>
@@ -732,11 +713,24 @@
           <a:p>
             <a:r>
               <a:rPr lang="en-GB" dirty="0"/>
-              <a:t>Source https://techcrunch.com/2017/06/27/facebook-2-billion-users/</a:t>
-            </a:r>
-          </a:p>
-          <a:p>
-            <a:endParaRPr lang="en-GB" dirty="0"/>
+              <a:t>Discuss availability, </a:t>
+            </a:r>
+            <a:r>
+              <a:rPr lang="en-GB" dirty="0" err="1"/>
+              <a:t>api</a:t>
+            </a:r>
+            <a:r>
+              <a:rPr lang="en-GB" dirty="0"/>
+              <a:t> </a:t>
+            </a:r>
+            <a:r>
+              <a:rPr lang="en-GB" dirty="0" err="1"/>
+              <a:t>etc</a:t>
+            </a:r>
+            <a:r>
+              <a:rPr lang="en-GB" dirty="0"/>
+              <a:t>… for each</a:t>
+            </a:r>
           </a:p>
         </p:txBody>
       </p:sp>
@@ -757,7 +751,7 @@
           <a:p>
             <a:fld id="{1FCF5342-079E-44A6-ABEB-0241FE63E21A}" type="slidenum">
               <a:rPr lang="en-GB" smtClean="0"/>
-              <a:t>6</a:t>
+              <a:t>5</a:t>
             </a:fld>
             <a:endParaRPr lang="en-GB"/>
           </a:p>
@@ -766,7 +760,7 @@
     </p:spTree>
     <p:extLst>
       <p:ext uri="{BB962C8B-B14F-4D97-AF65-F5344CB8AC3E}">
-        <p14:creationId xmlns:p14="http://schemas.microsoft.com/office/powerpoint/2010/main" val="3843417758"/>
+        <p14:creationId xmlns:p14="http://schemas.microsoft.com/office/powerpoint/2010/main" val="2518031338"/>
       </p:ext>
     </p:extLst>
   </p:cSld>
@@ -820,6 +814,12 @@
           <a:bodyPr/>
           <a:lstStyle/>
           <a:p>
+            <a:r>
+              <a:rPr lang="en-GB" dirty="0"/>
+              <a:t>Source https://techcrunch.com/2017/06/27/facebook-2-billion-users/</a:t>
+            </a:r>
+          </a:p>
+          <a:p>
             <a:endParaRPr lang="en-GB" dirty="0"/>
           </a:p>
         </p:txBody>
@@ -839,18 +839,18 @@
           <a:bodyPr/>
           <a:lstStyle/>
           <a:p>
-            <a:fld id="{9D3E0FAC-92B7-4344-B8CE-D78B9752AB0B}" type="slidenum">
-              <a:rPr lang="en-US" smtClean="0"/>
-              <a:t>12</a:t>
+            <a:fld id="{1FCF5342-079E-44A6-ABEB-0241FE63E21A}" type="slidenum">
+              <a:rPr lang="en-GB" smtClean="0"/>
+              <a:t>6</a:t>
             </a:fld>
-            <a:endParaRPr lang="en-US"/>
+            <a:endParaRPr lang="en-GB"/>
           </a:p>
         </p:txBody>
       </p:sp>
     </p:spTree>
     <p:extLst>
       <p:ext uri="{BB962C8B-B14F-4D97-AF65-F5344CB8AC3E}">
-        <p14:creationId xmlns:p14="http://schemas.microsoft.com/office/powerpoint/2010/main" val="322558776"/>
+        <p14:creationId xmlns:p14="http://schemas.microsoft.com/office/powerpoint/2010/main" val="3843417758"/>
       </p:ext>
     </p:extLst>
   </p:cSld>
@@ -925,7 +925,7 @@
           <a:p>
             <a:fld id="{9D3E0FAC-92B7-4344-B8CE-D78B9752AB0B}" type="slidenum">
               <a:rPr lang="en-US" smtClean="0"/>
-              <a:t>15</a:t>
+              <a:t>12</a:t>
             </a:fld>
             <a:endParaRPr lang="en-US"/>
           </a:p>
@@ -934,7 +934,7 @@
     </p:spTree>
     <p:extLst>
       <p:ext uri="{BB962C8B-B14F-4D97-AF65-F5344CB8AC3E}">
-        <p14:creationId xmlns:p14="http://schemas.microsoft.com/office/powerpoint/2010/main" val="4277242014"/>
+        <p14:creationId xmlns:p14="http://schemas.microsoft.com/office/powerpoint/2010/main" val="322558776"/>
       </p:ext>
     </p:extLst>
   </p:cSld>
@@ -1009,6 +1009,90 @@
           <a:p>
             <a:fld id="{9D3E0FAC-92B7-4344-B8CE-D78B9752AB0B}" type="slidenum">
               <a:rPr lang="en-US" smtClean="0"/>
+              <a:t>15</a:t>
+            </a:fld>
+            <a:endParaRPr lang="en-US"/>
+          </a:p>
+        </p:txBody>
+      </p:sp>
+    </p:spTree>
+    <p:extLst>
+      <p:ext uri="{BB962C8B-B14F-4D97-AF65-F5344CB8AC3E}">
+        <p14:creationId xmlns:p14="http://schemas.microsoft.com/office/powerpoint/2010/main" val="4277242014"/>
+      </p:ext>
+    </p:extLst>
+  </p:cSld>
+  <p:clrMapOvr>
+    <a:masterClrMapping/>
+  </p:clrMapOvr>
+</p:notes>
+</file>
+
+<file path=ppt/notesSlides/notesSlide7.xml><?xml version="1.0" encoding="utf-8"?>
+<p:notes xmlns:a="http://schemas.openxmlformats.org/drawingml/2006/main" xmlns:r="http://schemas.openxmlformats.org/officeDocument/2006/relationships" xmlns:p="http://schemas.openxmlformats.org/presentationml/2006/main">
+  <p:cSld>
+    <p:spTree>
+      <p:nvGrpSpPr>
+        <p:cNvPr id="1" name=""/>
+        <p:cNvGrpSpPr/>
+        <p:nvPr/>
+      </p:nvGrpSpPr>
+      <p:grpSpPr>
+        <a:xfrm>
+          <a:off x="0" y="0"/>
+          <a:ext cx="0" cy="0"/>
+          <a:chOff x="0" y="0"/>
+          <a:chExt cx="0" cy="0"/>
+        </a:xfrm>
+      </p:grpSpPr>
+      <p:sp>
+        <p:nvSpPr>
+          <p:cNvPr id="2" name="Slide Image Placeholder 1"/>
+          <p:cNvSpPr>
+            <a:spLocks noGrp="1" noRot="1" noChangeAspect="1"/>
+          </p:cNvSpPr>
+          <p:nvPr>
+            <p:ph type="sldImg"/>
+          </p:nvPr>
+        </p:nvSpPr>
+        <p:spPr/>
+      </p:sp>
+      <p:sp>
+        <p:nvSpPr>
+          <p:cNvPr id="3" name="Notes Placeholder 2"/>
+          <p:cNvSpPr>
+            <a:spLocks noGrp="1"/>
+          </p:cNvSpPr>
+          <p:nvPr>
+            <p:ph type="body" idx="1"/>
+          </p:nvPr>
+        </p:nvSpPr>
+        <p:spPr/>
+        <p:txBody>
+          <a:bodyPr/>
+          <a:lstStyle/>
+          <a:p>
+            <a:endParaRPr lang="en-GB" dirty="0"/>
+          </a:p>
+        </p:txBody>
+      </p:sp>
+      <p:sp>
+        <p:nvSpPr>
+          <p:cNvPr id="4" name="Slide Number Placeholder 3"/>
+          <p:cNvSpPr>
+            <a:spLocks noGrp="1"/>
+          </p:cNvSpPr>
+          <p:nvPr>
+            <p:ph type="sldNum" sz="quarter" idx="10"/>
+          </p:nvPr>
+        </p:nvSpPr>
+        <p:spPr/>
+        <p:txBody>
+          <a:bodyPr/>
+          <a:lstStyle/>
+          <a:p>
+            <a:fld id="{9D3E0FAC-92B7-4344-B8CE-D78B9752AB0B}" type="slidenum">
+              <a:rPr lang="en-US" smtClean="0"/>
               <a:t>16</a:t>
             </a:fld>
             <a:endParaRPr lang="en-US"/>
@@ -1028,7 +1112,7 @@
 </p:notes>
 </file>
 
-<file path=ppt/notesSlides/notesSlide7.xml><?xml version="1.0" encoding="utf-8"?>
+<file path=ppt/notesSlides/notesSlide8.xml><?xml version="1.0" encoding="utf-8"?>
 <p:notes xmlns:a="http://schemas.openxmlformats.org/drawingml/2006/main" xmlns:r="http://schemas.openxmlformats.org/officeDocument/2006/relationships" xmlns:p="http://schemas.openxmlformats.org/presentationml/2006/main">
   <p:cSld>
     <p:spTree>
@@ -1241,9 +1325,9 @@
           <a:bodyPr/>
           <a:lstStyle/>
           <a:p>
-            <a:fld id="{7CC7A2F6-2F19-4AE6-AE33-E09CFF174DCA}" type="datetimeFigureOut">
+            <a:fld id="{23A9E97F-7B70-48CB-88B1-5F21059BB2B8}" type="datetime1">
               <a:rPr lang="en-GB" smtClean="0"/>
-              <a:t>19/04/2018</a:t>
+              <a:t>20/04/2018</a:t>
             </a:fld>
             <a:endParaRPr lang="en-GB"/>
           </a:p>
@@ -1411,9 +1495,9 @@
           <a:bodyPr/>
           <a:lstStyle/>
           <a:p>
-            <a:fld id="{7CC7A2F6-2F19-4AE6-AE33-E09CFF174DCA}" type="datetimeFigureOut">
+            <a:fld id="{891E19A1-8553-4DB3-9DE2-49E86FFC745F}" type="datetime1">
               <a:rPr lang="en-GB" smtClean="0"/>
-              <a:t>19/04/2018</a:t>
+              <a:t>20/04/2018</a:t>
             </a:fld>
             <a:endParaRPr lang="en-GB"/>
           </a:p>
@@ -1591,9 +1675,9 @@
           <a:bodyPr/>
           <a:lstStyle/>
           <a:p>
-            <a:fld id="{7CC7A2F6-2F19-4AE6-AE33-E09CFF174DCA}" type="datetimeFigureOut">
+            <a:fld id="{8ECA4800-2910-409E-ABBE-0FA75EC58D1F}" type="datetime1">
               <a:rPr lang="en-GB" smtClean="0"/>
-              <a:t>19/04/2018</a:t>
+              <a:t>20/04/2018</a:t>
             </a:fld>
             <a:endParaRPr lang="en-GB"/>
           </a:p>
@@ -1761,9 +1845,9 @@
           <a:bodyPr/>
           <a:lstStyle/>
           <a:p>
-            <a:fld id="{7CC7A2F6-2F19-4AE6-AE33-E09CFF174DCA}" type="datetimeFigureOut">
+            <a:fld id="{71BEFD56-6E1A-488A-B494-AAE30CD1B488}" type="datetime1">
               <a:rPr lang="en-GB" smtClean="0"/>
-              <a:t>19/04/2018</a:t>
+              <a:t>20/04/2018</a:t>
             </a:fld>
             <a:endParaRPr lang="en-GB"/>
           </a:p>
@@ -2005,9 +2089,9 @@
           <a:bodyPr/>
           <a:lstStyle/>
           <a:p>
-            <a:fld id="{7CC7A2F6-2F19-4AE6-AE33-E09CFF174DCA}" type="datetimeFigureOut">
+            <a:fld id="{8C215D00-5603-4DD7-BE72-7353B6DBE57C}" type="datetime1">
               <a:rPr lang="en-GB" smtClean="0"/>
-              <a:t>19/04/2018</a:t>
+              <a:t>20/04/2018</a:t>
             </a:fld>
             <a:endParaRPr lang="en-GB"/>
           </a:p>
@@ -2237,9 +2321,9 @@
           <a:bodyPr/>
           <a:lstStyle/>
           <a:p>
-            <a:fld id="{7CC7A2F6-2F19-4AE6-AE33-E09CFF174DCA}" type="datetimeFigureOut">
+            <a:fld id="{A8EA05D1-6B67-47DE-9B5A-8FB1C49D6C39}" type="datetime1">
               <a:rPr lang="en-GB" smtClean="0"/>
-              <a:t>19/04/2018</a:t>
+              <a:t>20/04/2018</a:t>
             </a:fld>
             <a:endParaRPr lang="en-GB"/>
           </a:p>
@@ -2604,9 +2688,9 @@
           <a:bodyPr/>
           <a:lstStyle/>
           <a:p>
-            <a:fld id="{7CC7A2F6-2F19-4AE6-AE33-E09CFF174DCA}" type="datetimeFigureOut">
+            <a:fld id="{2902075D-528D-46CB-B047-4B0F09ED4242}" type="datetime1">
               <a:rPr lang="en-GB" smtClean="0"/>
-              <a:t>19/04/2018</a:t>
+              <a:t>20/04/2018</a:t>
             </a:fld>
             <a:endParaRPr lang="en-GB"/>
           </a:p>
@@ -2722,9 +2806,9 @@
           <a:bodyPr/>
           <a:lstStyle/>
           <a:p>
-            <a:fld id="{7CC7A2F6-2F19-4AE6-AE33-E09CFF174DCA}" type="datetimeFigureOut">
+            <a:fld id="{ACCE21D4-7A69-4436-8A06-304B88E20996}" type="datetime1">
               <a:rPr lang="en-GB" smtClean="0"/>
-              <a:t>19/04/2018</a:t>
+              <a:t>20/04/2018</a:t>
             </a:fld>
             <a:endParaRPr lang="en-GB"/>
           </a:p>
@@ -2817,9 +2901,9 @@
           <a:bodyPr/>
           <a:lstStyle/>
           <a:p>
-            <a:fld id="{7CC7A2F6-2F19-4AE6-AE33-E09CFF174DCA}" type="datetimeFigureOut">
+            <a:fld id="{F3D9569B-E4C9-4DCF-B71C-181C30780B2C}" type="datetime1">
               <a:rPr lang="en-GB" smtClean="0"/>
-              <a:t>19/04/2018</a:t>
+              <a:t>20/04/2018</a:t>
             </a:fld>
             <a:endParaRPr lang="en-GB"/>
           </a:p>
@@ -3094,9 +3178,9 @@
           <a:bodyPr/>
           <a:lstStyle/>
           <a:p>
-            <a:fld id="{7CC7A2F6-2F19-4AE6-AE33-E09CFF174DCA}" type="datetimeFigureOut">
+            <a:fld id="{8F4C2393-37AD-4E37-B1D1-23EE98EED6CB}" type="datetime1">
               <a:rPr lang="en-GB" smtClean="0"/>
-              <a:t>19/04/2018</a:t>
+              <a:t>20/04/2018</a:t>
             </a:fld>
             <a:endParaRPr lang="en-GB"/>
           </a:p>
@@ -3351,9 +3435,9 @@
           <a:bodyPr/>
           <a:lstStyle/>
           <a:p>
-            <a:fld id="{7CC7A2F6-2F19-4AE6-AE33-E09CFF174DCA}" type="datetimeFigureOut">
+            <a:fld id="{E7289B7D-FED5-4C7F-AB20-9F029634F3A1}" type="datetime1">
               <a:rPr lang="en-GB" smtClean="0"/>
-              <a:t>19/04/2018</a:t>
+              <a:t>20/04/2018</a:t>
             </a:fld>
             <a:endParaRPr lang="en-GB"/>
           </a:p>
@@ -3564,9 +3648,9 @@
             </a:lvl1pPr>
           </a:lstStyle>
           <a:p>
-            <a:fld id="{7CC7A2F6-2F19-4AE6-AE33-E09CFF174DCA}" type="datetimeFigureOut">
+            <a:fld id="{1616BED4-634B-4BD7-BC80-DF280D866888}" type="datetime1">
               <a:rPr lang="en-GB" smtClean="0"/>
-              <a:t>19/04/2018</a:t>
+              <a:t>20/04/2018</a:t>
             </a:fld>
             <a:endParaRPr lang="en-GB"/>
           </a:p>
@@ -3671,6 +3755,7 @@
     <p:sldLayoutId id="2147483670" r:id="rId10"/>
     <p:sldLayoutId id="2147483671" r:id="rId11"/>
   </p:sldLayoutIdLst>
+  <p:hf hdr="0" ftr="0" dt="0"/>
   <p:txStyles>
     <p:titleStyle>
       <a:lvl1pPr algn="l" defTabSz="914400" rtl="0" eaLnBrk="1" latinLnBrk="0" hangingPunct="1">
@@ -3987,8 +4072,8 @@
           <a:lstStyle/>
           <a:p>
             <a:r>
-              <a:rPr lang="en-GB" dirty="0"/>
-              <a:t>Data </a:t>
+              <a:rPr lang="en-GB" dirty="0" smtClean="0"/>
+              <a:t>SMASAC - Data </a:t>
             </a:r>
             <a:r>
               <a:rPr lang="en-GB" dirty="0" smtClean="0"/>
@@ -4848,6 +4933,40 @@
           <a:p>
             <a:pPr algn="ctr"/>
             <a:endParaRPr lang="en-GB"/>
+          </a:p>
+        </p:txBody>
+      </p:sp>
+      <p:sp>
+        <p:nvSpPr>
+          <p:cNvPr id="14" name="Subtitle 2"/>
+          <p:cNvSpPr>
+            <a:spLocks noGrp="1"/>
+          </p:cNvSpPr>
+          <p:nvPr>
+            <p:ph type="subTitle" idx="1"/>
+          </p:nvPr>
+        </p:nvSpPr>
+        <p:spPr>
+          <a:xfrm>
+            <a:off x="1143000" y="3602038"/>
+            <a:ext cx="6858000" cy="1655762"/>
+          </a:xfrm>
+        </p:spPr>
+        <p:txBody>
+          <a:bodyPr/>
+          <a:lstStyle/>
+          <a:p>
+            <a:r>
+              <a:rPr lang="en-GB" u="sng" dirty="0" smtClean="0"/>
+              <a:t>GRÉGOIRE BUREL</a:t>
+            </a:r>
+            <a:r>
+              <a:rPr lang="en-GB" dirty="0" smtClean="0"/>
+              <a:t>, MAYANK KEJRIWAL AND PRASHANT KHARE</a:t>
+            </a:r>
+          </a:p>
+          <a:p>
+            <a:endParaRPr lang="en-GB" dirty="0"/>
           </a:p>
         </p:txBody>
       </p:sp>
@@ -5779,6 +5898,29 @@
           </a:p>
         </p:txBody>
       </p:sp>
+      <p:sp>
+        <p:nvSpPr>
+          <p:cNvPr id="2" name="Slide Number Placeholder 1"/>
+          <p:cNvSpPr>
+            <a:spLocks noGrp="1"/>
+          </p:cNvSpPr>
+          <p:nvPr>
+            <p:ph type="sldNum" sz="quarter" idx="12"/>
+          </p:nvPr>
+        </p:nvSpPr>
+        <p:spPr/>
+        <p:txBody>
+          <a:bodyPr/>
+          <a:lstStyle/>
+          <a:p>
+            <a:fld id="{D63D4D68-E5E1-497F-B018-33FA9D88ECA8}" type="slidenum">
+              <a:rPr lang="en-GB" smtClean="0"/>
+              <a:t>10</a:t>
+            </a:fld>
+            <a:endParaRPr lang="en-GB"/>
+          </a:p>
+        </p:txBody>
+      </p:sp>
     </p:spTree>
     <p:extLst>
       <p:ext uri="{BB962C8B-B14F-4D97-AF65-F5344CB8AC3E}">
@@ -8148,6 +8290,29 @@
               </a:rPr>
               <a:t>?</a:t>
             </a:r>
+          </a:p>
+        </p:txBody>
+      </p:sp>
+      <p:sp>
+        <p:nvSpPr>
+          <p:cNvPr id="3" name="Slide Number Placeholder 2"/>
+          <p:cNvSpPr>
+            <a:spLocks noGrp="1"/>
+          </p:cNvSpPr>
+          <p:nvPr>
+            <p:ph type="sldNum" sz="quarter" idx="12"/>
+          </p:nvPr>
+        </p:nvSpPr>
+        <p:spPr/>
+        <p:txBody>
+          <a:bodyPr/>
+          <a:lstStyle/>
+          <a:p>
+            <a:fld id="{D63D4D68-E5E1-497F-B018-33FA9D88ECA8}" type="slidenum">
+              <a:rPr lang="en-GB" smtClean="0"/>
+              <a:t>11</a:t>
+            </a:fld>
+            <a:endParaRPr lang="en-GB"/>
           </a:p>
         </p:txBody>
       </p:sp>
@@ -9188,6 +9353,29 @@
             <a:endParaRPr lang="en-GB" sz="1400" dirty="0">
               <a:cs typeface="Roboto Light"/>
             </a:endParaRPr>
+          </a:p>
+        </p:txBody>
+      </p:sp>
+      <p:sp>
+        <p:nvSpPr>
+          <p:cNvPr id="3" name="Slide Number Placeholder 2"/>
+          <p:cNvSpPr>
+            <a:spLocks noGrp="1"/>
+          </p:cNvSpPr>
+          <p:nvPr>
+            <p:ph type="sldNum" sz="quarter" idx="12"/>
+          </p:nvPr>
+        </p:nvSpPr>
+        <p:spPr/>
+        <p:txBody>
+          <a:bodyPr/>
+          <a:lstStyle/>
+          <a:p>
+            <a:fld id="{D63D4D68-E5E1-497F-B018-33FA9D88ECA8}" type="slidenum">
+              <a:rPr lang="en-GB" smtClean="0"/>
+              <a:t>12</a:t>
+            </a:fld>
+            <a:endParaRPr lang="en-GB"/>
           </a:p>
         </p:txBody>
       </p:sp>
@@ -9633,6 +9821,29 @@
           </a:p>
         </p:txBody>
       </p:sp>
+      <p:sp>
+        <p:nvSpPr>
+          <p:cNvPr id="4" name="Slide Number Placeholder 3"/>
+          <p:cNvSpPr>
+            <a:spLocks noGrp="1"/>
+          </p:cNvSpPr>
+          <p:nvPr>
+            <p:ph type="sldNum" sz="quarter" idx="12"/>
+          </p:nvPr>
+        </p:nvSpPr>
+        <p:spPr/>
+        <p:txBody>
+          <a:bodyPr/>
+          <a:lstStyle/>
+          <a:p>
+            <a:fld id="{D63D4D68-E5E1-497F-B018-33FA9D88ECA8}" type="slidenum">
+              <a:rPr lang="en-GB" smtClean="0"/>
+              <a:t>13</a:t>
+            </a:fld>
+            <a:endParaRPr lang="en-GB"/>
+          </a:p>
+        </p:txBody>
+      </p:sp>
     </p:spTree>
     <p:extLst>
       <p:ext uri="{BB962C8B-B14F-4D97-AF65-F5344CB8AC3E}">
@@ -10204,6 +10415,29 @@
               <a:ea typeface="Roboto Light" charset="0"/>
               <a:cs typeface="Roboto Light" charset="0"/>
             </a:endParaRPr>
+          </a:p>
+        </p:txBody>
+      </p:sp>
+      <p:sp>
+        <p:nvSpPr>
+          <p:cNvPr id="3" name="Slide Number Placeholder 2"/>
+          <p:cNvSpPr>
+            <a:spLocks noGrp="1"/>
+          </p:cNvSpPr>
+          <p:nvPr>
+            <p:ph type="sldNum" sz="quarter" idx="12"/>
+          </p:nvPr>
+        </p:nvSpPr>
+        <p:spPr/>
+        <p:txBody>
+          <a:bodyPr/>
+          <a:lstStyle/>
+          <a:p>
+            <a:fld id="{D63D4D68-E5E1-497F-B018-33FA9D88ECA8}" type="slidenum">
+              <a:rPr lang="en-GB" smtClean="0"/>
+              <a:t>14</a:t>
+            </a:fld>
+            <a:endParaRPr lang="en-GB"/>
           </a:p>
         </p:txBody>
       </p:sp>
@@ -10516,6 +10750,29 @@
               <a:rPr lang="en-GB" dirty="0"/>
               <a:t>Filtering using Social Media APIs</a:t>
             </a:r>
+          </a:p>
+        </p:txBody>
+      </p:sp>
+      <p:sp>
+        <p:nvSpPr>
+          <p:cNvPr id="2" name="Slide Number Placeholder 1"/>
+          <p:cNvSpPr>
+            <a:spLocks noGrp="1"/>
+          </p:cNvSpPr>
+          <p:nvPr>
+            <p:ph type="sldNum" sz="quarter" idx="12"/>
+          </p:nvPr>
+        </p:nvSpPr>
+        <p:spPr/>
+        <p:txBody>
+          <a:bodyPr/>
+          <a:lstStyle/>
+          <a:p>
+            <a:fld id="{D63D4D68-E5E1-497F-B018-33FA9D88ECA8}" type="slidenum">
+              <a:rPr lang="en-GB" smtClean="0"/>
+              <a:t>15</a:t>
+            </a:fld>
+            <a:endParaRPr lang="en-GB"/>
           </a:p>
         </p:txBody>
       </p:sp>
@@ -11057,6 +11314,29 @@
           </a:p>
         </p:txBody>
       </p:sp>
+      <p:sp>
+        <p:nvSpPr>
+          <p:cNvPr id="2" name="Slide Number Placeholder 1"/>
+          <p:cNvSpPr>
+            <a:spLocks noGrp="1"/>
+          </p:cNvSpPr>
+          <p:nvPr>
+            <p:ph type="sldNum" sz="quarter" idx="12"/>
+          </p:nvPr>
+        </p:nvSpPr>
+        <p:spPr/>
+        <p:txBody>
+          <a:bodyPr/>
+          <a:lstStyle/>
+          <a:p>
+            <a:fld id="{D63D4D68-E5E1-497F-B018-33FA9D88ECA8}" type="slidenum">
+              <a:rPr lang="en-GB" smtClean="0"/>
+              <a:t>16</a:t>
+            </a:fld>
+            <a:endParaRPr lang="en-GB"/>
+          </a:p>
+        </p:txBody>
+      </p:sp>
     </p:spTree>
     <p:extLst>
       <p:ext uri="{BB962C8B-B14F-4D97-AF65-F5344CB8AC3E}">
@@ -11490,6 +11770,29 @@
           </a:p>
         </p:txBody>
       </p:sp>
+      <p:sp>
+        <p:nvSpPr>
+          <p:cNvPr id="2" name="Slide Number Placeholder 1"/>
+          <p:cNvSpPr>
+            <a:spLocks noGrp="1"/>
+          </p:cNvSpPr>
+          <p:nvPr>
+            <p:ph type="sldNum" sz="quarter" idx="12"/>
+          </p:nvPr>
+        </p:nvSpPr>
+        <p:spPr/>
+        <p:txBody>
+          <a:bodyPr/>
+          <a:lstStyle/>
+          <a:p>
+            <a:fld id="{D63D4D68-E5E1-497F-B018-33FA9D88ECA8}" type="slidenum">
+              <a:rPr lang="en-GB" smtClean="0"/>
+              <a:t>17</a:t>
+            </a:fld>
+            <a:endParaRPr lang="en-GB"/>
+          </a:p>
+        </p:txBody>
+      </p:sp>
     </p:spTree>
     <p:extLst>
       <p:ext uri="{BB962C8B-B14F-4D97-AF65-F5344CB8AC3E}">
@@ -11856,6 +12159,29 @@
           </a:extLst>
         </p:spPr>
       </p:pic>
+      <p:sp>
+        <p:nvSpPr>
+          <p:cNvPr id="3" name="Slide Number Placeholder 2"/>
+          <p:cNvSpPr>
+            <a:spLocks noGrp="1"/>
+          </p:cNvSpPr>
+          <p:nvPr>
+            <p:ph type="sldNum" sz="quarter" idx="12"/>
+          </p:nvPr>
+        </p:nvSpPr>
+        <p:spPr/>
+        <p:txBody>
+          <a:bodyPr/>
+          <a:lstStyle/>
+          <a:p>
+            <a:fld id="{D63D4D68-E5E1-497F-B018-33FA9D88ECA8}" type="slidenum">
+              <a:rPr lang="en-GB" smtClean="0"/>
+              <a:t>18</a:t>
+            </a:fld>
+            <a:endParaRPr lang="en-GB"/>
+          </a:p>
+        </p:txBody>
+      </p:sp>
     </p:spTree>
     <p:extLst>
       <p:ext uri="{BB962C8B-B14F-4D97-AF65-F5344CB8AC3E}">
@@ -12168,6 +12494,29 @@
               <a:buNone/>
             </a:pPr>
             <a:endParaRPr lang="en-GB" sz="2400" dirty="0"/>
+          </a:p>
+        </p:txBody>
+      </p:sp>
+      <p:sp>
+        <p:nvSpPr>
+          <p:cNvPr id="3" name="Slide Number Placeholder 2"/>
+          <p:cNvSpPr>
+            <a:spLocks noGrp="1"/>
+          </p:cNvSpPr>
+          <p:nvPr>
+            <p:ph type="sldNum" sz="quarter" idx="12"/>
+          </p:nvPr>
+        </p:nvSpPr>
+        <p:spPr/>
+        <p:txBody>
+          <a:bodyPr/>
+          <a:lstStyle/>
+          <a:p>
+            <a:fld id="{D63D4D68-E5E1-497F-B018-33FA9D88ECA8}" type="slidenum">
+              <a:rPr lang="en-GB" smtClean="0"/>
+              <a:t>19</a:t>
+            </a:fld>
+            <a:endParaRPr lang="en-GB"/>
           </a:p>
         </p:txBody>
       </p:sp>
@@ -12483,6 +12832,29 @@
           </a:extLst>
         </p:spPr>
       </p:pic>
+      <p:sp>
+        <p:nvSpPr>
+          <p:cNvPr id="4" name="Slide Number Placeholder 3"/>
+          <p:cNvSpPr>
+            <a:spLocks noGrp="1"/>
+          </p:cNvSpPr>
+          <p:nvPr>
+            <p:ph type="sldNum" sz="quarter" idx="12"/>
+          </p:nvPr>
+        </p:nvSpPr>
+        <p:spPr/>
+        <p:txBody>
+          <a:bodyPr/>
+          <a:lstStyle/>
+          <a:p>
+            <a:fld id="{D63D4D68-E5E1-497F-B018-33FA9D88ECA8}" type="slidenum">
+              <a:rPr lang="en-GB" smtClean="0"/>
+              <a:t>2</a:t>
+            </a:fld>
+            <a:endParaRPr lang="en-GB"/>
+          </a:p>
+        </p:txBody>
+      </p:sp>
     </p:spTree>
     <p:extLst>
       <p:ext uri="{BB962C8B-B14F-4D97-AF65-F5344CB8AC3E}">
@@ -13455,6 +13827,29 @@
           </a:p>
         </p:txBody>
       </p:sp>
+      <p:sp>
+        <p:nvSpPr>
+          <p:cNvPr id="11" name="Slide Number Placeholder 10"/>
+          <p:cNvSpPr>
+            <a:spLocks noGrp="1"/>
+          </p:cNvSpPr>
+          <p:nvPr>
+            <p:ph type="sldNum" sz="quarter" idx="12"/>
+          </p:nvPr>
+        </p:nvSpPr>
+        <p:spPr/>
+        <p:txBody>
+          <a:bodyPr/>
+          <a:lstStyle/>
+          <a:p>
+            <a:fld id="{D63D4D68-E5E1-497F-B018-33FA9D88ECA8}" type="slidenum">
+              <a:rPr lang="en-GB" smtClean="0"/>
+              <a:t>20</a:t>
+            </a:fld>
+            <a:endParaRPr lang="en-GB"/>
+          </a:p>
+        </p:txBody>
+      </p:sp>
     </p:spTree>
     <p:extLst>
       <p:ext uri="{BB962C8B-B14F-4D97-AF65-F5344CB8AC3E}">
@@ -14440,6 +14835,29 @@
               <a:rPr lang="en-US" i="1" dirty="0"/>
               <a:t>St. Denis”</a:t>
             </a:r>
+          </a:p>
+        </p:txBody>
+      </p:sp>
+      <p:sp>
+        <p:nvSpPr>
+          <p:cNvPr id="3" name="Slide Number Placeholder 2"/>
+          <p:cNvSpPr>
+            <a:spLocks noGrp="1"/>
+          </p:cNvSpPr>
+          <p:nvPr>
+            <p:ph type="sldNum" sz="quarter" idx="12"/>
+          </p:nvPr>
+        </p:nvSpPr>
+        <p:spPr/>
+        <p:txBody>
+          <a:bodyPr/>
+          <a:lstStyle/>
+          <a:p>
+            <a:fld id="{D63D4D68-E5E1-497F-B018-33FA9D88ECA8}" type="slidenum">
+              <a:rPr lang="en-GB" smtClean="0"/>
+              <a:t>21</a:t>
+            </a:fld>
+            <a:endParaRPr lang="en-GB"/>
           </a:p>
         </p:txBody>
       </p:sp>
@@ -17680,6 +18098,29 @@
           </a:p>
         </p:txBody>
       </p:sp>
+      <p:sp>
+        <p:nvSpPr>
+          <p:cNvPr id="3" name="Slide Number Placeholder 2"/>
+          <p:cNvSpPr>
+            <a:spLocks noGrp="1"/>
+          </p:cNvSpPr>
+          <p:nvPr>
+            <p:ph type="sldNum" sz="quarter" idx="12"/>
+          </p:nvPr>
+        </p:nvSpPr>
+        <p:spPr/>
+        <p:txBody>
+          <a:bodyPr/>
+          <a:lstStyle/>
+          <a:p>
+            <a:fld id="{D63D4D68-E5E1-497F-B018-33FA9D88ECA8}" type="slidenum">
+              <a:rPr lang="en-GB" smtClean="0"/>
+              <a:t>22</a:t>
+            </a:fld>
+            <a:endParaRPr lang="en-GB"/>
+          </a:p>
+        </p:txBody>
+      </p:sp>
     </p:spTree>
     <p:extLst>
       <p:ext uri="{BB962C8B-B14F-4D97-AF65-F5344CB8AC3E}">
@@ -21576,6 +22017,29 @@
           </a:prstGeom>
         </p:spPr>
       </p:pic>
+      <p:sp>
+        <p:nvSpPr>
+          <p:cNvPr id="3" name="Slide Number Placeholder 2"/>
+          <p:cNvSpPr>
+            <a:spLocks noGrp="1"/>
+          </p:cNvSpPr>
+          <p:nvPr>
+            <p:ph type="sldNum" sz="quarter" idx="12"/>
+          </p:nvPr>
+        </p:nvSpPr>
+        <p:spPr/>
+        <p:txBody>
+          <a:bodyPr/>
+          <a:lstStyle/>
+          <a:p>
+            <a:fld id="{D63D4D68-E5E1-497F-B018-33FA9D88ECA8}" type="slidenum">
+              <a:rPr lang="en-GB" smtClean="0"/>
+              <a:t>23</a:t>
+            </a:fld>
+            <a:endParaRPr lang="en-GB"/>
+          </a:p>
+        </p:txBody>
+      </p:sp>
     </p:spTree>
     <p:extLst>
       <p:ext uri="{BB962C8B-B14F-4D97-AF65-F5344CB8AC3E}">
@@ -21853,6 +22317,29 @@
           </a:extLst>
         </p:spPr>
       </p:pic>
+      <p:sp>
+        <p:nvSpPr>
+          <p:cNvPr id="5" name="Slide Number Placeholder 4"/>
+          <p:cNvSpPr>
+            <a:spLocks noGrp="1"/>
+          </p:cNvSpPr>
+          <p:nvPr>
+            <p:ph type="sldNum" sz="quarter" idx="12"/>
+          </p:nvPr>
+        </p:nvSpPr>
+        <p:spPr/>
+        <p:txBody>
+          <a:bodyPr/>
+          <a:lstStyle/>
+          <a:p>
+            <a:fld id="{D63D4D68-E5E1-497F-B018-33FA9D88ECA8}" type="slidenum">
+              <a:rPr lang="en-GB" smtClean="0"/>
+              <a:t>25</a:t>
+            </a:fld>
+            <a:endParaRPr lang="en-GB"/>
+          </a:p>
+        </p:txBody>
+      </p:sp>
     </p:spTree>
     <p:extLst>
       <p:ext uri="{BB962C8B-B14F-4D97-AF65-F5344CB8AC3E}">
@@ -22084,6 +22571,29 @@
           </a:extLst>
         </p:spPr>
       </p:pic>
+      <p:sp>
+        <p:nvSpPr>
+          <p:cNvPr id="5" name="Slide Number Placeholder 4"/>
+          <p:cNvSpPr>
+            <a:spLocks noGrp="1"/>
+          </p:cNvSpPr>
+          <p:nvPr>
+            <p:ph type="sldNum" sz="quarter" idx="12"/>
+          </p:nvPr>
+        </p:nvSpPr>
+        <p:spPr/>
+        <p:txBody>
+          <a:bodyPr/>
+          <a:lstStyle/>
+          <a:p>
+            <a:fld id="{D63D4D68-E5E1-497F-B018-33FA9D88ECA8}" type="slidenum">
+              <a:rPr lang="en-GB" smtClean="0"/>
+              <a:t>3</a:t>
+            </a:fld>
+            <a:endParaRPr lang="en-GB"/>
+          </a:p>
+        </p:txBody>
+      </p:sp>
     </p:spTree>
     <p:extLst>
       <p:ext uri="{BB962C8B-B14F-4D97-AF65-F5344CB8AC3E}">
@@ -22298,6 +22808,29 @@
               <a:rPr lang="en-GB" sz="1050" dirty="0"/>
               <a:t> </a:t>
             </a:r>
+          </a:p>
+        </p:txBody>
+      </p:sp>
+      <p:sp>
+        <p:nvSpPr>
+          <p:cNvPr id="3" name="Slide Number Placeholder 2"/>
+          <p:cNvSpPr>
+            <a:spLocks noGrp="1"/>
+          </p:cNvSpPr>
+          <p:nvPr>
+            <p:ph type="sldNum" sz="quarter" idx="12"/>
+          </p:nvPr>
+        </p:nvSpPr>
+        <p:spPr/>
+        <p:txBody>
+          <a:bodyPr/>
+          <a:lstStyle/>
+          <a:p>
+            <a:fld id="{D63D4D68-E5E1-497F-B018-33FA9D88ECA8}" type="slidenum">
+              <a:rPr lang="en-GB" smtClean="0"/>
+              <a:t>4</a:t>
+            </a:fld>
+            <a:endParaRPr lang="en-GB"/>
           </a:p>
         </p:txBody>
       </p:sp>
@@ -22362,42 +22895,42 @@
                 <a:gridCol w="2914649">
                   <a:extLst>
                     <a:ext uri="{9D8B030D-6E8A-4147-A177-3AD203B41FA5}">
-                      <a16:colId xmlns:a16="http://schemas.microsoft.com/office/drawing/2014/main" xmlns="" val="20000"/>
+                      <a16:colId xmlns="" xmlns:a16="http://schemas.microsoft.com/office/drawing/2014/main" val="20000"/>
                     </a:ext>
                   </a:extLst>
                 </a:gridCol>
                 <a:gridCol w="1212397">
                   <a:extLst>
                     <a:ext uri="{9D8B030D-6E8A-4147-A177-3AD203B41FA5}">
-                      <a16:colId xmlns:a16="http://schemas.microsoft.com/office/drawing/2014/main" xmlns="" val="20001"/>
+                      <a16:colId xmlns="" xmlns:a16="http://schemas.microsoft.com/office/drawing/2014/main" val="20001"/>
                     </a:ext>
                   </a:extLst>
                 </a:gridCol>
                 <a:gridCol w="1255836">
                   <a:extLst>
                     <a:ext uri="{9D8B030D-6E8A-4147-A177-3AD203B41FA5}">
-                      <a16:colId xmlns:a16="http://schemas.microsoft.com/office/drawing/2014/main" xmlns="" val="20002"/>
+                      <a16:colId xmlns="" xmlns:a16="http://schemas.microsoft.com/office/drawing/2014/main" val="20002"/>
                     </a:ext>
                   </a:extLst>
                 </a:gridCol>
                 <a:gridCol w="944593">
                   <a:extLst>
                     <a:ext uri="{9D8B030D-6E8A-4147-A177-3AD203B41FA5}">
-                      <a16:colId xmlns:a16="http://schemas.microsoft.com/office/drawing/2014/main" xmlns="" val="20003"/>
+                      <a16:colId xmlns="" xmlns:a16="http://schemas.microsoft.com/office/drawing/2014/main" val="20003"/>
                     </a:ext>
                   </a:extLst>
                 </a:gridCol>
                 <a:gridCol w="1863306">
                   <a:extLst>
                     <a:ext uri="{9D8B030D-6E8A-4147-A177-3AD203B41FA5}">
-                      <a16:colId xmlns:a16="http://schemas.microsoft.com/office/drawing/2014/main" xmlns="" val="20004"/>
+                      <a16:colId xmlns="" xmlns:a16="http://schemas.microsoft.com/office/drawing/2014/main" val="20004"/>
                     </a:ext>
                   </a:extLst>
                 </a:gridCol>
                 <a:gridCol w="969547">
                   <a:extLst>
                     <a:ext uri="{9D8B030D-6E8A-4147-A177-3AD203B41FA5}">
-                      <a16:colId xmlns:a16="http://schemas.microsoft.com/office/drawing/2014/main" xmlns="" val="20005"/>
+                      <a16:colId xmlns="" xmlns:a16="http://schemas.microsoft.com/office/drawing/2014/main" val="20005"/>
                     </a:ext>
                   </a:extLst>
                 </a:gridCol>
@@ -22483,7 +23016,7 @@
                 </a:tc>
                 <a:extLst>
                   <a:ext uri="{0D108BD9-81ED-4DB2-BD59-A6C34878D82A}">
-                    <a16:rowId xmlns:a16="http://schemas.microsoft.com/office/drawing/2014/main" xmlns="" val="10000"/>
+                    <a16:rowId xmlns="" xmlns:a16="http://schemas.microsoft.com/office/drawing/2014/main" val="10000"/>
                   </a:ext>
                 </a:extLst>
               </a:tr>
@@ -22568,7 +23101,7 @@
                 </a:tc>
                 <a:extLst>
                   <a:ext uri="{0D108BD9-81ED-4DB2-BD59-A6C34878D82A}">
-                    <a16:rowId xmlns:a16="http://schemas.microsoft.com/office/drawing/2014/main" xmlns="" val="10001"/>
+                    <a16:rowId xmlns="" xmlns:a16="http://schemas.microsoft.com/office/drawing/2014/main" val="10001"/>
                   </a:ext>
                 </a:extLst>
               </a:tr>
@@ -22653,7 +23186,7 @@
                 </a:tc>
                 <a:extLst>
                   <a:ext uri="{0D108BD9-81ED-4DB2-BD59-A6C34878D82A}">
-                    <a16:rowId xmlns:a16="http://schemas.microsoft.com/office/drawing/2014/main" xmlns="" val="10002"/>
+                    <a16:rowId xmlns="" xmlns:a16="http://schemas.microsoft.com/office/drawing/2014/main" val="10002"/>
                   </a:ext>
                 </a:extLst>
               </a:tr>
@@ -22738,7 +23271,7 @@
                 </a:tc>
                 <a:extLst>
                   <a:ext uri="{0D108BD9-81ED-4DB2-BD59-A6C34878D82A}">
-                    <a16:rowId xmlns:a16="http://schemas.microsoft.com/office/drawing/2014/main" xmlns="" val="10003"/>
+                    <a16:rowId xmlns="" xmlns:a16="http://schemas.microsoft.com/office/drawing/2014/main" val="10003"/>
                   </a:ext>
                 </a:extLst>
               </a:tr>
@@ -22828,7 +23361,7 @@
                 </a:tc>
                 <a:extLst>
                   <a:ext uri="{0D108BD9-81ED-4DB2-BD59-A6C34878D82A}">
-                    <a16:rowId xmlns:a16="http://schemas.microsoft.com/office/drawing/2014/main" xmlns="" val="10004"/>
+                    <a16:rowId xmlns="" xmlns:a16="http://schemas.microsoft.com/office/drawing/2014/main" val="10004"/>
                   </a:ext>
                 </a:extLst>
               </a:tr>
@@ -22913,7 +23446,7 @@
                 </a:tc>
                 <a:extLst>
                   <a:ext uri="{0D108BD9-81ED-4DB2-BD59-A6C34878D82A}">
-                    <a16:rowId xmlns:a16="http://schemas.microsoft.com/office/drawing/2014/main" xmlns="" val="10005"/>
+                    <a16:rowId xmlns="" xmlns:a16="http://schemas.microsoft.com/office/drawing/2014/main" val="10005"/>
                   </a:ext>
                 </a:extLst>
               </a:tr>
@@ -22998,7 +23531,7 @@
                 </a:tc>
                 <a:extLst>
                   <a:ext uri="{0D108BD9-81ED-4DB2-BD59-A6C34878D82A}">
-                    <a16:rowId xmlns:a16="http://schemas.microsoft.com/office/drawing/2014/main" xmlns="" val="10006"/>
+                    <a16:rowId xmlns="" xmlns:a16="http://schemas.microsoft.com/office/drawing/2014/main" val="10006"/>
                   </a:ext>
                 </a:extLst>
               </a:tr>
@@ -23083,7 +23616,7 @@
                 </a:tc>
                 <a:extLst>
                   <a:ext uri="{0D108BD9-81ED-4DB2-BD59-A6C34878D82A}">
-                    <a16:rowId xmlns:a16="http://schemas.microsoft.com/office/drawing/2014/main" xmlns="" val="10007"/>
+                    <a16:rowId xmlns="" xmlns:a16="http://schemas.microsoft.com/office/drawing/2014/main" val="10007"/>
                   </a:ext>
                 </a:extLst>
               </a:tr>
@@ -23168,7 +23701,7 @@
                 </a:tc>
                 <a:extLst>
                   <a:ext uri="{0D108BD9-81ED-4DB2-BD59-A6C34878D82A}">
-                    <a16:rowId xmlns:a16="http://schemas.microsoft.com/office/drawing/2014/main" xmlns="" val="10008"/>
+                    <a16:rowId xmlns="" xmlns:a16="http://schemas.microsoft.com/office/drawing/2014/main" val="10008"/>
                   </a:ext>
                 </a:extLst>
               </a:tr>
@@ -24147,6 +24680,29 @@
           </a:extLst>
         </p:spPr>
       </p:pic>
+      <p:sp>
+        <p:nvSpPr>
+          <p:cNvPr id="3" name="Slide Number Placeholder 2"/>
+          <p:cNvSpPr>
+            <a:spLocks noGrp="1"/>
+          </p:cNvSpPr>
+          <p:nvPr>
+            <p:ph type="sldNum" sz="quarter" idx="12"/>
+          </p:nvPr>
+        </p:nvSpPr>
+        <p:spPr/>
+        <p:txBody>
+          <a:bodyPr/>
+          <a:lstStyle/>
+          <a:p>
+            <a:fld id="{D63D4D68-E5E1-497F-B018-33FA9D88ECA8}" type="slidenum">
+              <a:rPr lang="en-GB" smtClean="0"/>
+              <a:t>5</a:t>
+            </a:fld>
+            <a:endParaRPr lang="en-GB"/>
+          </a:p>
+        </p:txBody>
+      </p:sp>
     </p:spTree>
     <p:extLst>
       <p:ext uri="{BB962C8B-B14F-4D97-AF65-F5344CB8AC3E}">
@@ -24325,6 +24881,29 @@
           </a:extLst>
         </p:spPr>
       </p:pic>
+      <p:sp>
+        <p:nvSpPr>
+          <p:cNvPr id="3" name="Slide Number Placeholder 2"/>
+          <p:cNvSpPr>
+            <a:spLocks noGrp="1"/>
+          </p:cNvSpPr>
+          <p:nvPr>
+            <p:ph type="sldNum" sz="quarter" idx="12"/>
+          </p:nvPr>
+        </p:nvSpPr>
+        <p:spPr/>
+        <p:txBody>
+          <a:bodyPr/>
+          <a:lstStyle/>
+          <a:p>
+            <a:fld id="{D63D4D68-E5E1-497F-B018-33FA9D88ECA8}" type="slidenum">
+              <a:rPr lang="en-GB" smtClean="0"/>
+              <a:t>6</a:t>
+            </a:fld>
+            <a:endParaRPr lang="en-GB"/>
+          </a:p>
+        </p:txBody>
+      </p:sp>
     </p:spTree>
     <p:extLst>
       <p:ext uri="{BB962C8B-B14F-4D97-AF65-F5344CB8AC3E}">
@@ -24724,6 +25303,29 @@
           </a:fontRef>
         </p:style>
       </p:cxnSp>
+      <p:sp>
+        <p:nvSpPr>
+          <p:cNvPr id="5" name="Slide Number Placeholder 4"/>
+          <p:cNvSpPr>
+            <a:spLocks noGrp="1"/>
+          </p:cNvSpPr>
+          <p:nvPr>
+            <p:ph type="sldNum" sz="quarter" idx="12"/>
+          </p:nvPr>
+        </p:nvSpPr>
+        <p:spPr/>
+        <p:txBody>
+          <a:bodyPr/>
+          <a:lstStyle/>
+          <a:p>
+            <a:fld id="{D63D4D68-E5E1-497F-B018-33FA9D88ECA8}" type="slidenum">
+              <a:rPr lang="en-GB" smtClean="0"/>
+              <a:t>7</a:t>
+            </a:fld>
+            <a:endParaRPr lang="en-GB"/>
+          </a:p>
+        </p:txBody>
+      </p:sp>
     </p:spTree>
     <p:extLst>
       <p:ext uri="{BB962C8B-B14F-4D97-AF65-F5344CB8AC3E}">
@@ -25155,6 +25757,29 @@
           </a:fontRef>
         </p:style>
       </p:cxnSp>
+      <p:sp>
+        <p:nvSpPr>
+          <p:cNvPr id="5" name="Slide Number Placeholder 4"/>
+          <p:cNvSpPr>
+            <a:spLocks noGrp="1"/>
+          </p:cNvSpPr>
+          <p:nvPr>
+            <p:ph type="sldNum" sz="quarter" idx="12"/>
+          </p:nvPr>
+        </p:nvSpPr>
+        <p:spPr/>
+        <p:txBody>
+          <a:bodyPr/>
+          <a:lstStyle/>
+          <a:p>
+            <a:fld id="{D63D4D68-E5E1-497F-B018-33FA9D88ECA8}" type="slidenum">
+              <a:rPr lang="en-GB" smtClean="0"/>
+              <a:t>8</a:t>
+            </a:fld>
+            <a:endParaRPr lang="en-GB"/>
+          </a:p>
+        </p:txBody>
+      </p:sp>
     </p:spTree>
     <p:extLst>
       <p:ext uri="{BB962C8B-B14F-4D97-AF65-F5344CB8AC3E}">
@@ -27162,6 +27787,29 @@
                 <a:schemeClr val="bg1"/>
               </a:solidFill>
             </a:endParaRPr>
+          </a:p>
+        </p:txBody>
+      </p:sp>
+      <p:sp>
+        <p:nvSpPr>
+          <p:cNvPr id="4" name="Slide Number Placeholder 3"/>
+          <p:cNvSpPr>
+            <a:spLocks noGrp="1"/>
+          </p:cNvSpPr>
+          <p:nvPr>
+            <p:ph type="sldNum" sz="quarter" idx="12"/>
+          </p:nvPr>
+        </p:nvSpPr>
+        <p:spPr/>
+        <p:txBody>
+          <a:bodyPr/>
+          <a:lstStyle/>
+          <a:p>
+            <a:fld id="{D63D4D68-E5E1-497F-B018-33FA9D88ECA8}" type="slidenum">
+              <a:rPr lang="en-GB" smtClean="0"/>
+              <a:t>9</a:t>
+            </a:fld>
+            <a:endParaRPr lang="en-GB"/>
           </a:p>
         </p:txBody>
       </p:sp>

</xml_diff>

<commit_message>
Add references for intro and data collection
</commit_message>
<xml_diff>
--- a/slides/pptx/2-data-collection.pptx
+++ b/slides/pptx/2-data-collection.pptx
@@ -5,7 +5,7 @@
     <p:sldMasterId id="2147483660" r:id="rId1"/>
   </p:sldMasterIdLst>
   <p:notesMasterIdLst>
-    <p:notesMasterId r:id="rId27"/>
+    <p:notesMasterId r:id="rId28"/>
   </p:notesMasterIdLst>
   <p:sldIdLst>
     <p:sldId id="280" r:id="rId2"/>
@@ -25,14 +25,15 @@
     <p:sldId id="298" r:id="rId16"/>
     <p:sldId id="299" r:id="rId17"/>
     <p:sldId id="373" r:id="rId18"/>
-    <p:sldId id="302" r:id="rId19"/>
-    <p:sldId id="303" r:id="rId20"/>
-    <p:sldId id="309" r:id="rId21"/>
-    <p:sldId id="376" r:id="rId22"/>
-    <p:sldId id="378" r:id="rId23"/>
-    <p:sldId id="375" r:id="rId24"/>
-    <p:sldId id="289" r:id="rId25"/>
-    <p:sldId id="291" r:id="rId26"/>
+    <p:sldId id="379" r:id="rId19"/>
+    <p:sldId id="302" r:id="rId20"/>
+    <p:sldId id="303" r:id="rId21"/>
+    <p:sldId id="309" r:id="rId22"/>
+    <p:sldId id="376" r:id="rId23"/>
+    <p:sldId id="378" r:id="rId24"/>
+    <p:sldId id="375" r:id="rId25"/>
+    <p:sldId id="289" r:id="rId26"/>
+    <p:sldId id="291" r:id="rId27"/>
   </p:sldIdLst>
   <p:sldSz cx="9144000" cy="6858000" type="screen4x3"/>
   <p:notesSz cx="6858000" cy="9144000"/>
@@ -229,7 +230,7 @@
           <a:p>
             <a:fld id="{BE1256C8-1BA4-4200-90F3-9413893DDEA5}" type="datetimeFigureOut">
               <a:rPr lang="en-US" smtClean="0"/>
-              <a:t>4/21/2018</a:t>
+              <a:t>4/22/2018</a:t>
             </a:fld>
             <a:endParaRPr lang="en-US"/>
           </a:p>
@@ -1196,6 +1197,90 @@
 </p:notes>
 </file>
 
+<file path=ppt/notesSlides/notesSlide9.xml><?xml version="1.0" encoding="utf-8"?>
+<p:notes xmlns:a="http://schemas.openxmlformats.org/drawingml/2006/main" xmlns:r="http://schemas.openxmlformats.org/officeDocument/2006/relationships" xmlns:p="http://schemas.openxmlformats.org/presentationml/2006/main">
+  <p:cSld>
+    <p:spTree>
+      <p:nvGrpSpPr>
+        <p:cNvPr id="1" name=""/>
+        <p:cNvGrpSpPr/>
+        <p:nvPr/>
+      </p:nvGrpSpPr>
+      <p:grpSpPr>
+        <a:xfrm>
+          <a:off x="0" y="0"/>
+          <a:ext cx="0" cy="0"/>
+          <a:chOff x="0" y="0"/>
+          <a:chExt cx="0" cy="0"/>
+        </a:xfrm>
+      </p:grpSpPr>
+      <p:sp>
+        <p:nvSpPr>
+          <p:cNvPr id="2" name="Slide Image Placeholder 1"/>
+          <p:cNvSpPr>
+            <a:spLocks noGrp="1" noRot="1" noChangeAspect="1"/>
+          </p:cNvSpPr>
+          <p:nvPr>
+            <p:ph type="sldImg"/>
+          </p:nvPr>
+        </p:nvSpPr>
+        <p:spPr/>
+      </p:sp>
+      <p:sp>
+        <p:nvSpPr>
+          <p:cNvPr id="3" name="Notes Placeholder 2"/>
+          <p:cNvSpPr>
+            <a:spLocks noGrp="1"/>
+          </p:cNvSpPr>
+          <p:nvPr>
+            <p:ph type="body" idx="1"/>
+          </p:nvPr>
+        </p:nvSpPr>
+        <p:spPr/>
+        <p:txBody>
+          <a:bodyPr/>
+          <a:lstStyle/>
+          <a:p>
+            <a:endParaRPr lang="en-GB" dirty="0"/>
+          </a:p>
+        </p:txBody>
+      </p:sp>
+      <p:sp>
+        <p:nvSpPr>
+          <p:cNvPr id="4" name="Slide Number Placeholder 3"/>
+          <p:cNvSpPr>
+            <a:spLocks noGrp="1"/>
+          </p:cNvSpPr>
+          <p:nvPr>
+            <p:ph type="sldNum" sz="quarter" idx="10"/>
+          </p:nvPr>
+        </p:nvSpPr>
+        <p:spPr/>
+        <p:txBody>
+          <a:bodyPr/>
+          <a:lstStyle/>
+          <a:p>
+            <a:fld id="{9D3E0FAC-92B7-4344-B8CE-D78B9752AB0B}" type="slidenum">
+              <a:rPr lang="en-US" smtClean="0"/>
+              <a:t>18</a:t>
+            </a:fld>
+            <a:endParaRPr lang="en-US"/>
+          </a:p>
+        </p:txBody>
+      </p:sp>
+    </p:spTree>
+    <p:extLst>
+      <p:ext uri="{BB962C8B-B14F-4D97-AF65-F5344CB8AC3E}">
+        <p14:creationId xmlns:p14="http://schemas.microsoft.com/office/powerpoint/2010/main" val="1727474021"/>
+      </p:ext>
+    </p:extLst>
+  </p:cSld>
+  <p:clrMapOvr>
+    <a:masterClrMapping/>
+  </p:clrMapOvr>
+</p:notes>
+</file>
+
 <file path=ppt/slideLayouts/slideLayout1.xml><?xml version="1.0" encoding="utf-8"?>
 <p:sldLayout xmlns:a="http://schemas.openxmlformats.org/drawingml/2006/main" xmlns:r="http://schemas.openxmlformats.org/officeDocument/2006/relationships" xmlns:p="http://schemas.openxmlformats.org/presentationml/2006/main" type="title" preserve="1">
   <p:cSld name="Title Slide">
@@ -1327,7 +1412,7 @@
           <a:p>
             <a:fld id="{23A9E97F-7B70-48CB-88B1-5F21059BB2B8}" type="datetime1">
               <a:rPr lang="en-GB" smtClean="0"/>
-              <a:t>21/04/2018</a:t>
+              <a:t>22/04/2018</a:t>
             </a:fld>
             <a:endParaRPr lang="en-GB"/>
           </a:p>
@@ -1497,7 +1582,7 @@
           <a:p>
             <a:fld id="{891E19A1-8553-4DB3-9DE2-49E86FFC745F}" type="datetime1">
               <a:rPr lang="en-GB" smtClean="0"/>
-              <a:t>21/04/2018</a:t>
+              <a:t>22/04/2018</a:t>
             </a:fld>
             <a:endParaRPr lang="en-GB"/>
           </a:p>
@@ -1677,7 +1762,7 @@
           <a:p>
             <a:fld id="{8ECA4800-2910-409E-ABBE-0FA75EC58D1F}" type="datetime1">
               <a:rPr lang="en-GB" smtClean="0"/>
-              <a:t>21/04/2018</a:t>
+              <a:t>22/04/2018</a:t>
             </a:fld>
             <a:endParaRPr lang="en-GB"/>
           </a:p>
@@ -1847,7 +1932,7 @@
           <a:p>
             <a:fld id="{71BEFD56-6E1A-488A-B494-AAE30CD1B488}" type="datetime1">
               <a:rPr lang="en-GB" smtClean="0"/>
-              <a:t>21/04/2018</a:t>
+              <a:t>22/04/2018</a:t>
             </a:fld>
             <a:endParaRPr lang="en-GB"/>
           </a:p>
@@ -2091,7 +2176,7 @@
           <a:p>
             <a:fld id="{8C215D00-5603-4DD7-BE72-7353B6DBE57C}" type="datetime1">
               <a:rPr lang="en-GB" smtClean="0"/>
-              <a:t>21/04/2018</a:t>
+              <a:t>22/04/2018</a:t>
             </a:fld>
             <a:endParaRPr lang="en-GB"/>
           </a:p>
@@ -2323,7 +2408,7 @@
           <a:p>
             <a:fld id="{A8EA05D1-6B67-47DE-9B5A-8FB1C49D6C39}" type="datetime1">
               <a:rPr lang="en-GB" smtClean="0"/>
-              <a:t>21/04/2018</a:t>
+              <a:t>22/04/2018</a:t>
             </a:fld>
             <a:endParaRPr lang="en-GB"/>
           </a:p>
@@ -2690,7 +2775,7 @@
           <a:p>
             <a:fld id="{2902075D-528D-46CB-B047-4B0F09ED4242}" type="datetime1">
               <a:rPr lang="en-GB" smtClean="0"/>
-              <a:t>21/04/2018</a:t>
+              <a:t>22/04/2018</a:t>
             </a:fld>
             <a:endParaRPr lang="en-GB"/>
           </a:p>
@@ -2808,7 +2893,7 @@
           <a:p>
             <a:fld id="{ACCE21D4-7A69-4436-8A06-304B88E20996}" type="datetime1">
               <a:rPr lang="en-GB" smtClean="0"/>
-              <a:t>21/04/2018</a:t>
+              <a:t>22/04/2018</a:t>
             </a:fld>
             <a:endParaRPr lang="en-GB"/>
           </a:p>
@@ -2903,7 +2988,7 @@
           <a:p>
             <a:fld id="{F3D9569B-E4C9-4DCF-B71C-181C30780B2C}" type="datetime1">
               <a:rPr lang="en-GB" smtClean="0"/>
-              <a:t>21/04/2018</a:t>
+              <a:t>22/04/2018</a:t>
             </a:fld>
             <a:endParaRPr lang="en-GB"/>
           </a:p>
@@ -3180,7 +3265,7 @@
           <a:p>
             <a:fld id="{8F4C2393-37AD-4E37-B1D1-23EE98EED6CB}" type="datetime1">
               <a:rPr lang="en-GB" smtClean="0"/>
-              <a:t>21/04/2018</a:t>
+              <a:t>22/04/2018</a:t>
             </a:fld>
             <a:endParaRPr lang="en-GB"/>
           </a:p>
@@ -3437,7 +3522,7 @@
           <a:p>
             <a:fld id="{E7289B7D-FED5-4C7F-AB20-9F029634F3A1}" type="datetime1">
               <a:rPr lang="en-GB" smtClean="0"/>
-              <a:t>21/04/2018</a:t>
+              <a:t>22/04/2018</a:t>
             </a:fld>
             <a:endParaRPr lang="en-GB"/>
           </a:p>
@@ -3650,7 +3735,7 @@
           <a:p>
             <a:fld id="{1616BED4-634B-4BD7-BC80-DF280D866888}" type="datetime1">
               <a:rPr lang="en-GB" smtClean="0"/>
-              <a:t>21/04/2018</a:t>
+              <a:t>22/04/2018</a:t>
             </a:fld>
             <a:endParaRPr lang="en-GB"/>
           </a:p>
@@ -11828,6 +11913,473 @@
       </p:grpSpPr>
       <p:sp>
         <p:nvSpPr>
+          <p:cNvPr id="6" name="Content Placeholder 2"/>
+          <p:cNvSpPr txBox="1">
+            <a:spLocks/>
+          </p:cNvSpPr>
+          <p:nvPr/>
+        </p:nvSpPr>
+        <p:spPr>
+          <a:xfrm>
+            <a:off x="628650" y="1599597"/>
+            <a:ext cx="5176247" cy="4102564"/>
+          </a:xfrm>
+          <a:prstGeom prst="rect">
+            <a:avLst/>
+          </a:prstGeom>
+        </p:spPr>
+        <p:txBody>
+          <a:bodyPr vert="horz" lIns="91440" tIns="45720" rIns="91440" bIns="45720" rtlCol="0">
+            <a:noAutofit/>
+          </a:bodyPr>
+          <a:lstStyle>
+            <a:lvl1pPr marL="228600" indent="-228600" algn="l" defTabSz="914400" rtl="0" eaLnBrk="1" latinLnBrk="0" hangingPunct="1">
+              <a:lnSpc>
+                <a:spcPct val="90000"/>
+              </a:lnSpc>
+              <a:spcBef>
+                <a:spcPts val="1000"/>
+              </a:spcBef>
+              <a:buFont typeface="Arial" panose="020B0604020202020204" pitchFamily="34" charset="0"/>
+              <a:buChar char="•"/>
+              <a:defRPr sz="2800" kern="1200">
+                <a:solidFill>
+                  <a:schemeClr val="tx1"/>
+                </a:solidFill>
+                <a:latin typeface="+mn-lt"/>
+                <a:ea typeface="+mn-ea"/>
+                <a:cs typeface="+mn-cs"/>
+              </a:defRPr>
+            </a:lvl1pPr>
+            <a:lvl2pPr marL="685800" indent="-228600" algn="l" defTabSz="914400" rtl="0" eaLnBrk="1" latinLnBrk="0" hangingPunct="1">
+              <a:lnSpc>
+                <a:spcPct val="90000"/>
+              </a:lnSpc>
+              <a:spcBef>
+                <a:spcPts val="500"/>
+              </a:spcBef>
+              <a:buFont typeface="Arial" panose="020B0604020202020204" pitchFamily="34" charset="0"/>
+              <a:buChar char="•"/>
+              <a:defRPr sz="2400" kern="1200">
+                <a:solidFill>
+                  <a:schemeClr val="tx1"/>
+                </a:solidFill>
+                <a:latin typeface="+mn-lt"/>
+                <a:ea typeface="+mn-ea"/>
+                <a:cs typeface="+mn-cs"/>
+              </a:defRPr>
+            </a:lvl2pPr>
+            <a:lvl3pPr marL="1143000" indent="-228600" algn="l" defTabSz="914400" rtl="0" eaLnBrk="1" latinLnBrk="0" hangingPunct="1">
+              <a:lnSpc>
+                <a:spcPct val="90000"/>
+              </a:lnSpc>
+              <a:spcBef>
+                <a:spcPts val="500"/>
+              </a:spcBef>
+              <a:buFont typeface="Arial" panose="020B0604020202020204" pitchFamily="34" charset="0"/>
+              <a:buChar char="•"/>
+              <a:defRPr sz="2000" kern="1200">
+                <a:solidFill>
+                  <a:schemeClr val="tx1"/>
+                </a:solidFill>
+                <a:latin typeface="+mn-lt"/>
+                <a:ea typeface="+mn-ea"/>
+                <a:cs typeface="+mn-cs"/>
+              </a:defRPr>
+            </a:lvl3pPr>
+            <a:lvl4pPr marL="1600200" indent="-228600" algn="l" defTabSz="914400" rtl="0" eaLnBrk="1" latinLnBrk="0" hangingPunct="1">
+              <a:lnSpc>
+                <a:spcPct val="90000"/>
+              </a:lnSpc>
+              <a:spcBef>
+                <a:spcPts val="500"/>
+              </a:spcBef>
+              <a:buFont typeface="Arial" panose="020B0604020202020204" pitchFamily="34" charset="0"/>
+              <a:buChar char="•"/>
+              <a:defRPr sz="1800" kern="1200">
+                <a:solidFill>
+                  <a:schemeClr val="tx1"/>
+                </a:solidFill>
+                <a:latin typeface="+mn-lt"/>
+                <a:ea typeface="+mn-ea"/>
+                <a:cs typeface="+mn-cs"/>
+              </a:defRPr>
+            </a:lvl4pPr>
+            <a:lvl5pPr marL="2057400" indent="-228600" algn="l" defTabSz="914400" rtl="0" eaLnBrk="1" latinLnBrk="0" hangingPunct="1">
+              <a:lnSpc>
+                <a:spcPct val="90000"/>
+              </a:lnSpc>
+              <a:spcBef>
+                <a:spcPts val="500"/>
+              </a:spcBef>
+              <a:buFont typeface="Arial" panose="020B0604020202020204" pitchFamily="34" charset="0"/>
+              <a:buChar char="•"/>
+              <a:defRPr sz="1800" kern="1200">
+                <a:solidFill>
+                  <a:schemeClr val="tx1"/>
+                </a:solidFill>
+                <a:latin typeface="+mn-lt"/>
+                <a:ea typeface="+mn-ea"/>
+                <a:cs typeface="+mn-cs"/>
+              </a:defRPr>
+            </a:lvl5pPr>
+            <a:lvl6pPr marL="2514600" indent="-228600" algn="l" defTabSz="914400" rtl="0" eaLnBrk="1" latinLnBrk="0" hangingPunct="1">
+              <a:lnSpc>
+                <a:spcPct val="90000"/>
+              </a:lnSpc>
+              <a:spcBef>
+                <a:spcPts val="500"/>
+              </a:spcBef>
+              <a:buFont typeface="Arial" panose="020B0604020202020204" pitchFamily="34" charset="0"/>
+              <a:buChar char="•"/>
+              <a:defRPr sz="1800" kern="1200">
+                <a:solidFill>
+                  <a:schemeClr val="tx1"/>
+                </a:solidFill>
+                <a:latin typeface="+mn-lt"/>
+                <a:ea typeface="+mn-ea"/>
+                <a:cs typeface="+mn-cs"/>
+              </a:defRPr>
+            </a:lvl6pPr>
+            <a:lvl7pPr marL="2971800" indent="-228600" algn="l" defTabSz="914400" rtl="0" eaLnBrk="1" latinLnBrk="0" hangingPunct="1">
+              <a:lnSpc>
+                <a:spcPct val="90000"/>
+              </a:lnSpc>
+              <a:spcBef>
+                <a:spcPts val="500"/>
+              </a:spcBef>
+              <a:buFont typeface="Arial" panose="020B0604020202020204" pitchFamily="34" charset="0"/>
+              <a:buChar char="•"/>
+              <a:defRPr sz="1800" kern="1200">
+                <a:solidFill>
+                  <a:schemeClr val="tx1"/>
+                </a:solidFill>
+                <a:latin typeface="+mn-lt"/>
+                <a:ea typeface="+mn-ea"/>
+                <a:cs typeface="+mn-cs"/>
+              </a:defRPr>
+            </a:lvl7pPr>
+            <a:lvl8pPr marL="3429000" indent="-228600" algn="l" defTabSz="914400" rtl="0" eaLnBrk="1" latinLnBrk="0" hangingPunct="1">
+              <a:lnSpc>
+                <a:spcPct val="90000"/>
+              </a:lnSpc>
+              <a:spcBef>
+                <a:spcPts val="500"/>
+              </a:spcBef>
+              <a:buFont typeface="Arial" panose="020B0604020202020204" pitchFamily="34" charset="0"/>
+              <a:buChar char="•"/>
+              <a:defRPr sz="1800" kern="1200">
+                <a:solidFill>
+                  <a:schemeClr val="tx1"/>
+                </a:solidFill>
+                <a:latin typeface="+mn-lt"/>
+                <a:ea typeface="+mn-ea"/>
+                <a:cs typeface="+mn-cs"/>
+              </a:defRPr>
+            </a:lvl8pPr>
+            <a:lvl9pPr marL="3886200" indent="-228600" algn="l" defTabSz="914400" rtl="0" eaLnBrk="1" latinLnBrk="0" hangingPunct="1">
+              <a:lnSpc>
+                <a:spcPct val="90000"/>
+              </a:lnSpc>
+              <a:spcBef>
+                <a:spcPts val="500"/>
+              </a:spcBef>
+              <a:buFont typeface="Arial" panose="020B0604020202020204" pitchFamily="34" charset="0"/>
+              <a:buChar char="•"/>
+              <a:defRPr sz="1800" kern="1200">
+                <a:solidFill>
+                  <a:schemeClr val="tx1"/>
+                </a:solidFill>
+                <a:latin typeface="+mn-lt"/>
+                <a:ea typeface="+mn-ea"/>
+                <a:cs typeface="+mn-cs"/>
+              </a:defRPr>
+            </a:lvl9pPr>
+          </a:lstStyle>
+          <a:p>
+            <a:pPr>
+              <a:buFontTx/>
+              <a:buChar char="-"/>
+            </a:pPr>
+            <a:r>
+              <a:rPr lang="en-GB" sz="2000" dirty="0" smtClean="0"/>
+              <a:t>A simple approach for filtering textual data is to </a:t>
+            </a:r>
+            <a:r>
+              <a:rPr lang="en-GB" sz="2000" b="1" dirty="0" smtClean="0"/>
+              <a:t>group related documents automatically (clustering)</a:t>
+            </a:r>
+            <a:r>
+              <a:rPr lang="en-GB" sz="2000" dirty="0" smtClean="0"/>
+              <a:t>.</a:t>
+            </a:r>
+          </a:p>
+          <a:p>
+            <a:pPr lvl="1">
+              <a:buFontTx/>
+              <a:buChar char="-"/>
+            </a:pPr>
+            <a:r>
+              <a:rPr lang="en-GB" sz="1600" dirty="0" smtClean="0"/>
+              <a:t>E.g., K-Nearest Neighbour (</a:t>
+            </a:r>
+            <a:r>
+              <a:rPr lang="en-GB" sz="1600" dirty="0"/>
+              <a:t>K</a:t>
+            </a:r>
+            <a:r>
+              <a:rPr lang="en-GB" sz="1600" dirty="0" smtClean="0"/>
+              <a:t>NN), Latent </a:t>
+            </a:r>
+            <a:r>
+              <a:rPr lang="en-GB" sz="1600" dirty="0" err="1" smtClean="0"/>
+              <a:t>Dirichlet</a:t>
+            </a:r>
+            <a:r>
+              <a:rPr lang="en-GB" sz="1600" dirty="0" smtClean="0"/>
+              <a:t> Allocation (LDA) (</a:t>
+            </a:r>
+            <a:r>
+              <a:rPr lang="en-GB" sz="1600" dirty="0" err="1" smtClean="0"/>
+              <a:t>Blei</a:t>
+            </a:r>
+            <a:r>
+              <a:rPr lang="en-GB" sz="1600" dirty="0" smtClean="0"/>
+              <a:t> et al., 2003).</a:t>
+            </a:r>
+          </a:p>
+          <a:p>
+            <a:pPr lvl="1">
+              <a:buFontTx/>
+              <a:buChar char="-"/>
+            </a:pPr>
+            <a:endParaRPr lang="en-GB" sz="1600" dirty="0"/>
+          </a:p>
+          <a:p>
+            <a:pPr lvl="1">
+              <a:buFontTx/>
+              <a:buChar char="-"/>
+            </a:pPr>
+            <a:endParaRPr lang="en-GB" sz="1600" dirty="0" smtClean="0"/>
+          </a:p>
+          <a:p>
+            <a:pPr lvl="1">
+              <a:buFontTx/>
+              <a:buChar char="-"/>
+            </a:pPr>
+            <a:endParaRPr lang="en-GB" sz="1600" dirty="0"/>
+          </a:p>
+          <a:p>
+            <a:pPr lvl="1">
+              <a:buFontTx/>
+              <a:buChar char="-"/>
+            </a:pPr>
+            <a:endParaRPr lang="en-GB" sz="1600" dirty="0" smtClean="0"/>
+          </a:p>
+          <a:p>
+            <a:pPr lvl="1">
+              <a:buFontTx/>
+              <a:buChar char="-"/>
+            </a:pPr>
+            <a:endParaRPr lang="en-GB" sz="1600" dirty="0" smtClean="0"/>
+          </a:p>
+          <a:p>
+            <a:pPr>
+              <a:buFontTx/>
+              <a:buChar char="-"/>
+            </a:pPr>
+            <a:r>
+              <a:rPr lang="en-GB" sz="2000" dirty="0" smtClean="0"/>
+              <a:t>Text clustering approaches are unsupervised: </a:t>
+            </a:r>
+            <a:r>
+              <a:rPr lang="en-GB" sz="2000" b="1" dirty="0"/>
+              <a:t>m</a:t>
+            </a:r>
+            <a:r>
+              <a:rPr lang="en-GB" sz="2000" b="1" dirty="0" smtClean="0"/>
+              <a:t>anual annotations are unnecessary</a:t>
+            </a:r>
+            <a:r>
+              <a:rPr lang="en-GB" sz="2000" dirty="0" smtClean="0"/>
+              <a:t>.</a:t>
+            </a:r>
+          </a:p>
+          <a:p>
+            <a:pPr>
+              <a:buFontTx/>
+              <a:buChar char="-"/>
+            </a:pPr>
+            <a:r>
+              <a:rPr lang="en-GB" sz="2000" b="1" dirty="0" smtClean="0"/>
+              <a:t>Filtering</a:t>
+            </a:r>
+            <a:r>
+              <a:rPr lang="en-GB" sz="2000" dirty="0" smtClean="0"/>
+              <a:t> can then be done using the clusters generated by those models.</a:t>
+            </a:r>
+          </a:p>
+          <a:p>
+            <a:pPr>
+              <a:buFontTx/>
+              <a:buChar char="-"/>
+            </a:pPr>
+            <a:r>
+              <a:rPr lang="en-GB" sz="2000" dirty="0" smtClean="0"/>
+              <a:t>Unsupervised approaches are limited and may not always produce relevant clusters.</a:t>
+            </a:r>
+          </a:p>
+        </p:txBody>
+      </p:sp>
+      <p:sp>
+        <p:nvSpPr>
+          <p:cNvPr id="9" name="Title 8"/>
+          <p:cNvSpPr>
+            <a:spLocks noGrp="1"/>
+          </p:cNvSpPr>
+          <p:nvPr>
+            <p:ph type="title"/>
+          </p:nvPr>
+        </p:nvSpPr>
+        <p:spPr/>
+        <p:txBody>
+          <a:bodyPr/>
+          <a:lstStyle/>
+          <a:p>
+            <a:r>
+              <a:rPr lang="en-GB" dirty="0" smtClean="0"/>
+              <a:t>Text Clustering</a:t>
+            </a:r>
+            <a:endParaRPr lang="en-GB" dirty="0"/>
+          </a:p>
+        </p:txBody>
+      </p:sp>
+      <p:sp>
+        <p:nvSpPr>
+          <p:cNvPr id="2" name="Slide Number Placeholder 1"/>
+          <p:cNvSpPr>
+            <a:spLocks noGrp="1"/>
+          </p:cNvSpPr>
+          <p:nvPr>
+            <p:ph type="sldNum" sz="quarter" idx="12"/>
+          </p:nvPr>
+        </p:nvSpPr>
+        <p:spPr/>
+        <p:txBody>
+          <a:bodyPr/>
+          <a:lstStyle/>
+          <a:p>
+            <a:fld id="{D63D4D68-E5E1-497F-B018-33FA9D88ECA8}" type="slidenum">
+              <a:rPr lang="en-GB" smtClean="0"/>
+              <a:t>18</a:t>
+            </a:fld>
+            <a:endParaRPr lang="en-GB"/>
+          </a:p>
+        </p:txBody>
+      </p:sp>
+      <p:pic>
+        <p:nvPicPr>
+          <p:cNvPr id="13" name="Picture 12"/>
+          <p:cNvPicPr>
+            <a:picLocks noChangeAspect="1"/>
+          </p:cNvPicPr>
+          <p:nvPr/>
+        </p:nvPicPr>
+        <p:blipFill rotWithShape="1">
+          <a:blip r:embed="rId3"/>
+          <a:srcRect b="13619"/>
+          <a:stretch/>
+        </p:blipFill>
+        <p:spPr>
+          <a:xfrm rot="16200000">
+            <a:off x="4365087" y="1925353"/>
+            <a:ext cx="6861925" cy="3011216"/>
+          </a:xfrm>
+          <a:prstGeom prst="rect">
+            <a:avLst/>
+          </a:prstGeom>
+        </p:spPr>
+      </p:pic>
+      <p:pic>
+        <p:nvPicPr>
+          <p:cNvPr id="1040" name="Picture 16" descr="https://upload.wikimedia.org/wikipedia/commons/thumb/d/d3/Latent_Dirichlet_allocation.svg/593px-Latent_Dirichlet_allocation.svg.png"/>
+          <p:cNvPicPr>
+            <a:picLocks noChangeAspect="1" noChangeArrowheads="1"/>
+          </p:cNvPicPr>
+          <p:nvPr/>
+        </p:nvPicPr>
+        <p:blipFill>
+          <a:blip r:embed="rId4">
+            <a:extLst>
+              <a:ext uri="{28A0092B-C50C-407E-A947-70E740481C1C}">
+                <a14:useLocalDpi xmlns:a14="http://schemas.microsoft.com/office/drawing/2010/main" val="0"/>
+              </a:ext>
+            </a:extLst>
+          </a:blip>
+          <a:srcRect/>
+          <a:stretch>
+            <a:fillRect/>
+          </a:stretch>
+        </p:blipFill>
+        <p:spPr bwMode="auto">
+          <a:xfrm>
+            <a:off x="1518148" y="3057524"/>
+            <a:ext cx="2539502" cy="1331848"/>
+          </a:xfrm>
+          <a:prstGeom prst="rect">
+            <a:avLst/>
+          </a:prstGeom>
+          <a:noFill/>
+          <a:extLst>
+            <a:ext uri="{909E8E84-426E-40DD-AFC4-6F175D3DCCD1}">
+              <a14:hiddenFill xmlns:a14="http://schemas.microsoft.com/office/drawing/2010/main">
+                <a:solidFill>
+                  <a:srgbClr val="FFFFFF"/>
+                </a:solidFill>
+              </a14:hiddenFill>
+            </a:ext>
+          </a:extLst>
+        </p:spPr>
+      </p:pic>
+    </p:spTree>
+    <p:extLst>
+      <p:ext uri="{BB962C8B-B14F-4D97-AF65-F5344CB8AC3E}">
+        <p14:creationId xmlns:p14="http://schemas.microsoft.com/office/powerpoint/2010/main" val="1558988629"/>
+      </p:ext>
+    </p:extLst>
+  </p:cSld>
+  <p:clrMapOvr>
+    <a:masterClrMapping/>
+  </p:clrMapOvr>
+  <p:timing>
+    <p:tnLst>
+      <p:par>
+        <p:cTn id="1" dur="indefinite" restart="never" nodeType="tmRoot"/>
+      </p:par>
+    </p:tnLst>
+  </p:timing>
+</p:sld>
+</file>
+
+<file path=ppt/slides/slide19.xml><?xml version="1.0" encoding="utf-8"?>
+<p:sld xmlns:a="http://schemas.openxmlformats.org/drawingml/2006/main" xmlns:r="http://schemas.openxmlformats.org/officeDocument/2006/relationships" xmlns:p="http://schemas.openxmlformats.org/presentationml/2006/main">
+  <p:cSld>
+    <p:spTree>
+      <p:nvGrpSpPr>
+        <p:cNvPr id="1" name=""/>
+        <p:cNvGrpSpPr/>
+        <p:nvPr/>
+      </p:nvGrpSpPr>
+      <p:grpSpPr>
+        <a:xfrm>
+          <a:off x="0" y="0"/>
+          <a:ext cx="0" cy="0"/>
+          <a:chOff x="0" y="0"/>
+          <a:chExt cx="0" cy="0"/>
+        </a:xfrm>
+      </p:grpSpPr>
+      <p:sp>
+        <p:nvSpPr>
           <p:cNvPr id="2" name="Title 1"/>
           <p:cNvSpPr>
             <a:spLocks noGrp="1"/>
@@ -11895,12 +12447,21 @@
             </a:r>
             <a:r>
               <a:rPr lang="en-GB" sz="2400" b="1" dirty="0" smtClean="0"/>
-              <a:t>query</a:t>
+              <a:t>query </a:t>
             </a:r>
             <a:r>
               <a:rPr lang="en-GB" sz="2400" dirty="0" smtClean="0"/>
-              <a:t>:</a:t>
-            </a:r>
+              <a:t>(</a:t>
+            </a:r>
+            <a:r>
+              <a:rPr lang="en-GB" sz="2400" dirty="0" smtClean="0"/>
+              <a:t>Mangold et al.,  2007</a:t>
+            </a:r>
+            <a:r>
+              <a:rPr lang="en-GB" sz="2400" dirty="0" smtClean="0"/>
+              <a:t>):</a:t>
+            </a:r>
+            <a:endParaRPr lang="en-GB" sz="2400" dirty="0" smtClean="0"/>
           </a:p>
           <a:p>
             <a:r>
@@ -12172,7 +12733,7 @@
           <a:p>
             <a:fld id="{D63D4D68-E5E1-497F-B018-33FA9D88ECA8}" type="slidenum">
               <a:rPr lang="en-GB" smtClean="0"/>
-              <a:t>18</a:t>
+              <a:t>19</a:t>
             </a:fld>
             <a:endParaRPr lang="en-GB"/>
           </a:p>
@@ -12182,344 +12743,6 @@
     <p:extLst>
       <p:ext uri="{BB962C8B-B14F-4D97-AF65-F5344CB8AC3E}">
         <p14:creationId xmlns:p14="http://schemas.microsoft.com/office/powerpoint/2010/main" val="1159734230"/>
-      </p:ext>
-    </p:extLst>
-  </p:cSld>
-  <p:clrMapOvr>
-    <a:masterClrMapping/>
-  </p:clrMapOvr>
-  <p:timing>
-    <p:tnLst>
-      <p:par>
-        <p:cTn id="1" dur="indefinite" restart="never" nodeType="tmRoot"/>
-      </p:par>
-    </p:tnLst>
-  </p:timing>
-</p:sld>
-</file>
-
-<file path=ppt/slides/slide19.xml><?xml version="1.0" encoding="utf-8"?>
-<p:sld xmlns:a="http://schemas.openxmlformats.org/drawingml/2006/main" xmlns:r="http://schemas.openxmlformats.org/officeDocument/2006/relationships" xmlns:p="http://schemas.openxmlformats.org/presentationml/2006/main">
-  <p:cSld>
-    <p:spTree>
-      <p:nvGrpSpPr>
-        <p:cNvPr id="1" name=""/>
-        <p:cNvGrpSpPr/>
-        <p:nvPr/>
-      </p:nvGrpSpPr>
-      <p:grpSpPr>
-        <a:xfrm>
-          <a:off x="0" y="0"/>
-          <a:ext cx="0" cy="0"/>
-          <a:chOff x="0" y="0"/>
-          <a:chExt cx="0" cy="0"/>
-        </a:xfrm>
-      </p:grpSpPr>
-      <p:sp>
-        <p:nvSpPr>
-          <p:cNvPr id="2" name="Title 1"/>
-          <p:cNvSpPr>
-            <a:spLocks noGrp="1"/>
-          </p:cNvSpPr>
-          <p:nvPr>
-            <p:ph type="title"/>
-          </p:nvPr>
-        </p:nvSpPr>
-        <p:spPr/>
-        <p:txBody>
-          <a:bodyPr/>
-          <a:lstStyle/>
-          <a:p>
-            <a:r>
-              <a:rPr lang="en-US" dirty="0" smtClean="0"/>
-              <a:t>Semantic Search - Motivation</a:t>
-            </a:r>
-            <a:endParaRPr lang="en-US" dirty="0"/>
-          </a:p>
-        </p:txBody>
-      </p:sp>
-      <p:sp>
-        <p:nvSpPr>
-          <p:cNvPr id="4" name="Content Placeholder 2"/>
-          <p:cNvSpPr txBox="1">
-            <a:spLocks/>
-          </p:cNvSpPr>
-          <p:nvPr/>
-        </p:nvSpPr>
-        <p:spPr>
-          <a:xfrm>
-            <a:off x="628650" y="1825625"/>
-            <a:ext cx="5340635" cy="4351338"/>
-          </a:xfrm>
-          <a:prstGeom prst="rect">
-            <a:avLst/>
-          </a:prstGeom>
-        </p:spPr>
-        <p:txBody>
-          <a:bodyPr vert="horz" lIns="91440" tIns="45720" rIns="91440" bIns="45720" rtlCol="0">
-            <a:normAutofit/>
-          </a:bodyPr>
-          <a:lstStyle>
-            <a:lvl1pPr marL="228600" indent="-228600" algn="l" defTabSz="914400" rtl="0" eaLnBrk="1" latinLnBrk="0" hangingPunct="1">
-              <a:lnSpc>
-                <a:spcPct val="90000"/>
-              </a:lnSpc>
-              <a:spcBef>
-                <a:spcPts val="1000"/>
-              </a:spcBef>
-              <a:buFont typeface="Arial" panose="020B0604020202020204" pitchFamily="34" charset="0"/>
-              <a:buChar char="•"/>
-              <a:defRPr sz="2800" kern="1200">
-                <a:solidFill>
-                  <a:schemeClr val="tx1"/>
-                </a:solidFill>
-                <a:latin typeface="+mn-lt"/>
-                <a:ea typeface="+mn-ea"/>
-                <a:cs typeface="+mn-cs"/>
-              </a:defRPr>
-            </a:lvl1pPr>
-            <a:lvl2pPr marL="685800" indent="-228600" algn="l" defTabSz="914400" rtl="0" eaLnBrk="1" latinLnBrk="0" hangingPunct="1">
-              <a:lnSpc>
-                <a:spcPct val="90000"/>
-              </a:lnSpc>
-              <a:spcBef>
-                <a:spcPts val="500"/>
-              </a:spcBef>
-              <a:buFont typeface="Arial" panose="020B0604020202020204" pitchFamily="34" charset="0"/>
-              <a:buChar char="•"/>
-              <a:defRPr sz="2400" kern="1200">
-                <a:solidFill>
-                  <a:schemeClr val="tx1"/>
-                </a:solidFill>
-                <a:latin typeface="+mn-lt"/>
-                <a:ea typeface="+mn-ea"/>
-                <a:cs typeface="+mn-cs"/>
-              </a:defRPr>
-            </a:lvl2pPr>
-            <a:lvl3pPr marL="1143000" indent="-228600" algn="l" defTabSz="914400" rtl="0" eaLnBrk="1" latinLnBrk="0" hangingPunct="1">
-              <a:lnSpc>
-                <a:spcPct val="90000"/>
-              </a:lnSpc>
-              <a:spcBef>
-                <a:spcPts val="500"/>
-              </a:spcBef>
-              <a:buFont typeface="Arial" panose="020B0604020202020204" pitchFamily="34" charset="0"/>
-              <a:buChar char="•"/>
-              <a:defRPr sz="2000" kern="1200">
-                <a:solidFill>
-                  <a:schemeClr val="tx1"/>
-                </a:solidFill>
-                <a:latin typeface="+mn-lt"/>
-                <a:ea typeface="+mn-ea"/>
-                <a:cs typeface="+mn-cs"/>
-              </a:defRPr>
-            </a:lvl3pPr>
-            <a:lvl4pPr marL="1600200" indent="-228600" algn="l" defTabSz="914400" rtl="0" eaLnBrk="1" latinLnBrk="0" hangingPunct="1">
-              <a:lnSpc>
-                <a:spcPct val="90000"/>
-              </a:lnSpc>
-              <a:spcBef>
-                <a:spcPts val="500"/>
-              </a:spcBef>
-              <a:buFont typeface="Arial" panose="020B0604020202020204" pitchFamily="34" charset="0"/>
-              <a:buChar char="•"/>
-              <a:defRPr sz="1800" kern="1200">
-                <a:solidFill>
-                  <a:schemeClr val="tx1"/>
-                </a:solidFill>
-                <a:latin typeface="+mn-lt"/>
-                <a:ea typeface="+mn-ea"/>
-                <a:cs typeface="+mn-cs"/>
-              </a:defRPr>
-            </a:lvl4pPr>
-            <a:lvl5pPr marL="2057400" indent="-228600" algn="l" defTabSz="914400" rtl="0" eaLnBrk="1" latinLnBrk="0" hangingPunct="1">
-              <a:lnSpc>
-                <a:spcPct val="90000"/>
-              </a:lnSpc>
-              <a:spcBef>
-                <a:spcPts val="500"/>
-              </a:spcBef>
-              <a:buFont typeface="Arial" panose="020B0604020202020204" pitchFamily="34" charset="0"/>
-              <a:buChar char="•"/>
-              <a:defRPr sz="1800" kern="1200">
-                <a:solidFill>
-                  <a:schemeClr val="tx1"/>
-                </a:solidFill>
-                <a:latin typeface="+mn-lt"/>
-                <a:ea typeface="+mn-ea"/>
-                <a:cs typeface="+mn-cs"/>
-              </a:defRPr>
-            </a:lvl5pPr>
-            <a:lvl6pPr marL="2514600" indent="-228600" algn="l" defTabSz="914400" rtl="0" eaLnBrk="1" latinLnBrk="0" hangingPunct="1">
-              <a:lnSpc>
-                <a:spcPct val="90000"/>
-              </a:lnSpc>
-              <a:spcBef>
-                <a:spcPts val="500"/>
-              </a:spcBef>
-              <a:buFont typeface="Arial" panose="020B0604020202020204" pitchFamily="34" charset="0"/>
-              <a:buChar char="•"/>
-              <a:defRPr sz="1800" kern="1200">
-                <a:solidFill>
-                  <a:schemeClr val="tx1"/>
-                </a:solidFill>
-                <a:latin typeface="+mn-lt"/>
-                <a:ea typeface="+mn-ea"/>
-                <a:cs typeface="+mn-cs"/>
-              </a:defRPr>
-            </a:lvl6pPr>
-            <a:lvl7pPr marL="2971800" indent="-228600" algn="l" defTabSz="914400" rtl="0" eaLnBrk="1" latinLnBrk="0" hangingPunct="1">
-              <a:lnSpc>
-                <a:spcPct val="90000"/>
-              </a:lnSpc>
-              <a:spcBef>
-                <a:spcPts val="500"/>
-              </a:spcBef>
-              <a:buFont typeface="Arial" panose="020B0604020202020204" pitchFamily="34" charset="0"/>
-              <a:buChar char="•"/>
-              <a:defRPr sz="1800" kern="1200">
-                <a:solidFill>
-                  <a:schemeClr val="tx1"/>
-                </a:solidFill>
-                <a:latin typeface="+mn-lt"/>
-                <a:ea typeface="+mn-ea"/>
-                <a:cs typeface="+mn-cs"/>
-              </a:defRPr>
-            </a:lvl7pPr>
-            <a:lvl8pPr marL="3429000" indent="-228600" algn="l" defTabSz="914400" rtl="0" eaLnBrk="1" latinLnBrk="0" hangingPunct="1">
-              <a:lnSpc>
-                <a:spcPct val="90000"/>
-              </a:lnSpc>
-              <a:spcBef>
-                <a:spcPts val="500"/>
-              </a:spcBef>
-              <a:buFont typeface="Arial" panose="020B0604020202020204" pitchFamily="34" charset="0"/>
-              <a:buChar char="•"/>
-              <a:defRPr sz="1800" kern="1200">
-                <a:solidFill>
-                  <a:schemeClr val="tx1"/>
-                </a:solidFill>
-                <a:latin typeface="+mn-lt"/>
-                <a:ea typeface="+mn-ea"/>
-                <a:cs typeface="+mn-cs"/>
-              </a:defRPr>
-            </a:lvl8pPr>
-            <a:lvl9pPr marL="3886200" indent="-228600" algn="l" defTabSz="914400" rtl="0" eaLnBrk="1" latinLnBrk="0" hangingPunct="1">
-              <a:lnSpc>
-                <a:spcPct val="90000"/>
-              </a:lnSpc>
-              <a:spcBef>
-                <a:spcPts val="500"/>
-              </a:spcBef>
-              <a:buFont typeface="Arial" panose="020B0604020202020204" pitchFamily="34" charset="0"/>
-              <a:buChar char="•"/>
-              <a:defRPr sz="1800" kern="1200">
-                <a:solidFill>
-                  <a:schemeClr val="tx1"/>
-                </a:solidFill>
-                <a:latin typeface="+mn-lt"/>
-                <a:ea typeface="+mn-ea"/>
-                <a:cs typeface="+mn-cs"/>
-              </a:defRPr>
-            </a:lvl9pPr>
-          </a:lstStyle>
-          <a:p>
-            <a:r>
-              <a:rPr lang="en-GB" sz="2400" dirty="0" smtClean="0"/>
-              <a:t>Complex </a:t>
-            </a:r>
-            <a:r>
-              <a:rPr lang="en-GB" sz="2400" dirty="0"/>
-              <a:t>event/information types are non-trivial to be described by single entity or </a:t>
-            </a:r>
-            <a:r>
-              <a:rPr lang="en-GB" sz="2400" dirty="0" smtClean="0"/>
-              <a:t>keywords.</a:t>
-            </a:r>
-          </a:p>
-          <a:p>
-            <a:r>
-              <a:rPr lang="en-GB" sz="2400" dirty="0" smtClean="0"/>
-              <a:t>N-grams </a:t>
-            </a:r>
-            <a:r>
-              <a:rPr lang="en-GB" sz="2400" dirty="0"/>
-              <a:t>or bag of words do not directly contain semantic </a:t>
-            </a:r>
-            <a:r>
-              <a:rPr lang="en-GB" sz="2400" dirty="0" smtClean="0"/>
-              <a:t>information.</a:t>
-            </a:r>
-          </a:p>
-          <a:p>
-            <a:r>
-              <a:rPr lang="en-GB" sz="2400" dirty="0" smtClean="0"/>
-              <a:t>Search </a:t>
-            </a:r>
-            <a:r>
-              <a:rPr lang="en-GB" sz="2400" dirty="0"/>
-              <a:t>for content based on a theme/context instead of precise information.</a:t>
-            </a:r>
-          </a:p>
-          <a:p>
-            <a:pPr marL="0" indent="0">
-              <a:buNone/>
-            </a:pPr>
-            <a:endParaRPr lang="en-GB" sz="2400" dirty="0"/>
-          </a:p>
-          <a:p>
-            <a:pPr marL="0" indent="0">
-              <a:buNone/>
-            </a:pPr>
-            <a:endParaRPr lang="en-GB" sz="2400" dirty="0"/>
-          </a:p>
-          <a:p>
-            <a:pPr marL="0" indent="0">
-              <a:buNone/>
-            </a:pPr>
-            <a:endParaRPr lang="en-GB" sz="2400" dirty="0"/>
-          </a:p>
-          <a:p>
-            <a:pPr marL="0" indent="0">
-              <a:buNone/>
-            </a:pPr>
-            <a:endParaRPr lang="en-GB" sz="2400" dirty="0"/>
-          </a:p>
-          <a:p>
-            <a:pPr marL="0" indent="0">
-              <a:buNone/>
-            </a:pPr>
-            <a:endParaRPr lang="en-GB" sz="2400" dirty="0"/>
-          </a:p>
-        </p:txBody>
-      </p:sp>
-      <p:sp>
-        <p:nvSpPr>
-          <p:cNvPr id="3" name="Slide Number Placeholder 2"/>
-          <p:cNvSpPr>
-            <a:spLocks noGrp="1"/>
-          </p:cNvSpPr>
-          <p:nvPr>
-            <p:ph type="sldNum" sz="quarter" idx="12"/>
-          </p:nvPr>
-        </p:nvSpPr>
-        <p:spPr/>
-        <p:txBody>
-          <a:bodyPr/>
-          <a:lstStyle/>
-          <a:p>
-            <a:fld id="{D63D4D68-E5E1-497F-B018-33FA9D88ECA8}" type="slidenum">
-              <a:rPr lang="en-GB" smtClean="0"/>
-              <a:t>19</a:t>
-            </a:fld>
-            <a:endParaRPr lang="en-GB"/>
-          </a:p>
-        </p:txBody>
-      </p:sp>
-    </p:spTree>
-    <p:extLst>
-      <p:ext uri="{BB962C8B-B14F-4D97-AF65-F5344CB8AC3E}">
-        <p14:creationId xmlns:p14="http://schemas.microsoft.com/office/powerpoint/2010/main" val="1118778444"/>
       </p:ext>
     </p:extLst>
   </p:cSld>
@@ -12902,6 +13125,344 @@
 </file>
 
 <file path=ppt/slides/slide20.xml><?xml version="1.0" encoding="utf-8"?>
+<p:sld xmlns:a="http://schemas.openxmlformats.org/drawingml/2006/main" xmlns:r="http://schemas.openxmlformats.org/officeDocument/2006/relationships" xmlns:p="http://schemas.openxmlformats.org/presentationml/2006/main">
+  <p:cSld>
+    <p:spTree>
+      <p:nvGrpSpPr>
+        <p:cNvPr id="1" name=""/>
+        <p:cNvGrpSpPr/>
+        <p:nvPr/>
+      </p:nvGrpSpPr>
+      <p:grpSpPr>
+        <a:xfrm>
+          <a:off x="0" y="0"/>
+          <a:ext cx="0" cy="0"/>
+          <a:chOff x="0" y="0"/>
+          <a:chExt cx="0" cy="0"/>
+        </a:xfrm>
+      </p:grpSpPr>
+      <p:sp>
+        <p:nvSpPr>
+          <p:cNvPr id="2" name="Title 1"/>
+          <p:cNvSpPr>
+            <a:spLocks noGrp="1"/>
+          </p:cNvSpPr>
+          <p:nvPr>
+            <p:ph type="title"/>
+          </p:nvPr>
+        </p:nvSpPr>
+        <p:spPr/>
+        <p:txBody>
+          <a:bodyPr/>
+          <a:lstStyle/>
+          <a:p>
+            <a:r>
+              <a:rPr lang="en-US" dirty="0" smtClean="0"/>
+              <a:t>Semantic Search - Motivation</a:t>
+            </a:r>
+            <a:endParaRPr lang="en-US" dirty="0"/>
+          </a:p>
+        </p:txBody>
+      </p:sp>
+      <p:sp>
+        <p:nvSpPr>
+          <p:cNvPr id="4" name="Content Placeholder 2"/>
+          <p:cNvSpPr txBox="1">
+            <a:spLocks/>
+          </p:cNvSpPr>
+          <p:nvPr/>
+        </p:nvSpPr>
+        <p:spPr>
+          <a:xfrm>
+            <a:off x="628650" y="1825625"/>
+            <a:ext cx="5340635" cy="4351338"/>
+          </a:xfrm>
+          <a:prstGeom prst="rect">
+            <a:avLst/>
+          </a:prstGeom>
+        </p:spPr>
+        <p:txBody>
+          <a:bodyPr vert="horz" lIns="91440" tIns="45720" rIns="91440" bIns="45720" rtlCol="0">
+            <a:normAutofit/>
+          </a:bodyPr>
+          <a:lstStyle>
+            <a:lvl1pPr marL="228600" indent="-228600" algn="l" defTabSz="914400" rtl="0" eaLnBrk="1" latinLnBrk="0" hangingPunct="1">
+              <a:lnSpc>
+                <a:spcPct val="90000"/>
+              </a:lnSpc>
+              <a:spcBef>
+                <a:spcPts val="1000"/>
+              </a:spcBef>
+              <a:buFont typeface="Arial" panose="020B0604020202020204" pitchFamily="34" charset="0"/>
+              <a:buChar char="•"/>
+              <a:defRPr sz="2800" kern="1200">
+                <a:solidFill>
+                  <a:schemeClr val="tx1"/>
+                </a:solidFill>
+                <a:latin typeface="+mn-lt"/>
+                <a:ea typeface="+mn-ea"/>
+                <a:cs typeface="+mn-cs"/>
+              </a:defRPr>
+            </a:lvl1pPr>
+            <a:lvl2pPr marL="685800" indent="-228600" algn="l" defTabSz="914400" rtl="0" eaLnBrk="1" latinLnBrk="0" hangingPunct="1">
+              <a:lnSpc>
+                <a:spcPct val="90000"/>
+              </a:lnSpc>
+              <a:spcBef>
+                <a:spcPts val="500"/>
+              </a:spcBef>
+              <a:buFont typeface="Arial" panose="020B0604020202020204" pitchFamily="34" charset="0"/>
+              <a:buChar char="•"/>
+              <a:defRPr sz="2400" kern="1200">
+                <a:solidFill>
+                  <a:schemeClr val="tx1"/>
+                </a:solidFill>
+                <a:latin typeface="+mn-lt"/>
+                <a:ea typeface="+mn-ea"/>
+                <a:cs typeface="+mn-cs"/>
+              </a:defRPr>
+            </a:lvl2pPr>
+            <a:lvl3pPr marL="1143000" indent="-228600" algn="l" defTabSz="914400" rtl="0" eaLnBrk="1" latinLnBrk="0" hangingPunct="1">
+              <a:lnSpc>
+                <a:spcPct val="90000"/>
+              </a:lnSpc>
+              <a:spcBef>
+                <a:spcPts val="500"/>
+              </a:spcBef>
+              <a:buFont typeface="Arial" panose="020B0604020202020204" pitchFamily="34" charset="0"/>
+              <a:buChar char="•"/>
+              <a:defRPr sz="2000" kern="1200">
+                <a:solidFill>
+                  <a:schemeClr val="tx1"/>
+                </a:solidFill>
+                <a:latin typeface="+mn-lt"/>
+                <a:ea typeface="+mn-ea"/>
+                <a:cs typeface="+mn-cs"/>
+              </a:defRPr>
+            </a:lvl3pPr>
+            <a:lvl4pPr marL="1600200" indent="-228600" algn="l" defTabSz="914400" rtl="0" eaLnBrk="1" latinLnBrk="0" hangingPunct="1">
+              <a:lnSpc>
+                <a:spcPct val="90000"/>
+              </a:lnSpc>
+              <a:spcBef>
+                <a:spcPts val="500"/>
+              </a:spcBef>
+              <a:buFont typeface="Arial" panose="020B0604020202020204" pitchFamily="34" charset="0"/>
+              <a:buChar char="•"/>
+              <a:defRPr sz="1800" kern="1200">
+                <a:solidFill>
+                  <a:schemeClr val="tx1"/>
+                </a:solidFill>
+                <a:latin typeface="+mn-lt"/>
+                <a:ea typeface="+mn-ea"/>
+                <a:cs typeface="+mn-cs"/>
+              </a:defRPr>
+            </a:lvl4pPr>
+            <a:lvl5pPr marL="2057400" indent="-228600" algn="l" defTabSz="914400" rtl="0" eaLnBrk="1" latinLnBrk="0" hangingPunct="1">
+              <a:lnSpc>
+                <a:spcPct val="90000"/>
+              </a:lnSpc>
+              <a:spcBef>
+                <a:spcPts val="500"/>
+              </a:spcBef>
+              <a:buFont typeface="Arial" panose="020B0604020202020204" pitchFamily="34" charset="0"/>
+              <a:buChar char="•"/>
+              <a:defRPr sz="1800" kern="1200">
+                <a:solidFill>
+                  <a:schemeClr val="tx1"/>
+                </a:solidFill>
+                <a:latin typeface="+mn-lt"/>
+                <a:ea typeface="+mn-ea"/>
+                <a:cs typeface="+mn-cs"/>
+              </a:defRPr>
+            </a:lvl5pPr>
+            <a:lvl6pPr marL="2514600" indent="-228600" algn="l" defTabSz="914400" rtl="0" eaLnBrk="1" latinLnBrk="0" hangingPunct="1">
+              <a:lnSpc>
+                <a:spcPct val="90000"/>
+              </a:lnSpc>
+              <a:spcBef>
+                <a:spcPts val="500"/>
+              </a:spcBef>
+              <a:buFont typeface="Arial" panose="020B0604020202020204" pitchFamily="34" charset="0"/>
+              <a:buChar char="•"/>
+              <a:defRPr sz="1800" kern="1200">
+                <a:solidFill>
+                  <a:schemeClr val="tx1"/>
+                </a:solidFill>
+                <a:latin typeface="+mn-lt"/>
+                <a:ea typeface="+mn-ea"/>
+                <a:cs typeface="+mn-cs"/>
+              </a:defRPr>
+            </a:lvl6pPr>
+            <a:lvl7pPr marL="2971800" indent="-228600" algn="l" defTabSz="914400" rtl="0" eaLnBrk="1" latinLnBrk="0" hangingPunct="1">
+              <a:lnSpc>
+                <a:spcPct val="90000"/>
+              </a:lnSpc>
+              <a:spcBef>
+                <a:spcPts val="500"/>
+              </a:spcBef>
+              <a:buFont typeface="Arial" panose="020B0604020202020204" pitchFamily="34" charset="0"/>
+              <a:buChar char="•"/>
+              <a:defRPr sz="1800" kern="1200">
+                <a:solidFill>
+                  <a:schemeClr val="tx1"/>
+                </a:solidFill>
+                <a:latin typeface="+mn-lt"/>
+                <a:ea typeface="+mn-ea"/>
+                <a:cs typeface="+mn-cs"/>
+              </a:defRPr>
+            </a:lvl7pPr>
+            <a:lvl8pPr marL="3429000" indent="-228600" algn="l" defTabSz="914400" rtl="0" eaLnBrk="1" latinLnBrk="0" hangingPunct="1">
+              <a:lnSpc>
+                <a:spcPct val="90000"/>
+              </a:lnSpc>
+              <a:spcBef>
+                <a:spcPts val="500"/>
+              </a:spcBef>
+              <a:buFont typeface="Arial" panose="020B0604020202020204" pitchFamily="34" charset="0"/>
+              <a:buChar char="•"/>
+              <a:defRPr sz="1800" kern="1200">
+                <a:solidFill>
+                  <a:schemeClr val="tx1"/>
+                </a:solidFill>
+                <a:latin typeface="+mn-lt"/>
+                <a:ea typeface="+mn-ea"/>
+                <a:cs typeface="+mn-cs"/>
+              </a:defRPr>
+            </a:lvl8pPr>
+            <a:lvl9pPr marL="3886200" indent="-228600" algn="l" defTabSz="914400" rtl="0" eaLnBrk="1" latinLnBrk="0" hangingPunct="1">
+              <a:lnSpc>
+                <a:spcPct val="90000"/>
+              </a:lnSpc>
+              <a:spcBef>
+                <a:spcPts val="500"/>
+              </a:spcBef>
+              <a:buFont typeface="Arial" panose="020B0604020202020204" pitchFamily="34" charset="0"/>
+              <a:buChar char="•"/>
+              <a:defRPr sz="1800" kern="1200">
+                <a:solidFill>
+                  <a:schemeClr val="tx1"/>
+                </a:solidFill>
+                <a:latin typeface="+mn-lt"/>
+                <a:ea typeface="+mn-ea"/>
+                <a:cs typeface="+mn-cs"/>
+              </a:defRPr>
+            </a:lvl9pPr>
+          </a:lstStyle>
+          <a:p>
+            <a:r>
+              <a:rPr lang="en-GB" sz="2400" dirty="0" smtClean="0"/>
+              <a:t>Complex </a:t>
+            </a:r>
+            <a:r>
+              <a:rPr lang="en-GB" sz="2400" dirty="0"/>
+              <a:t>event/information types are non-trivial to be described by single entity or </a:t>
+            </a:r>
+            <a:r>
+              <a:rPr lang="en-GB" sz="2400" dirty="0" smtClean="0"/>
+              <a:t>keywords.</a:t>
+            </a:r>
+          </a:p>
+          <a:p>
+            <a:r>
+              <a:rPr lang="en-GB" sz="2400" dirty="0" smtClean="0"/>
+              <a:t>N-grams </a:t>
+            </a:r>
+            <a:r>
+              <a:rPr lang="en-GB" sz="2400" dirty="0"/>
+              <a:t>or bag of words do not directly contain semantic </a:t>
+            </a:r>
+            <a:r>
+              <a:rPr lang="en-GB" sz="2400" dirty="0" smtClean="0"/>
+              <a:t>information.</a:t>
+            </a:r>
+          </a:p>
+          <a:p>
+            <a:r>
+              <a:rPr lang="en-GB" sz="2400" dirty="0" smtClean="0"/>
+              <a:t>Search </a:t>
+            </a:r>
+            <a:r>
+              <a:rPr lang="en-GB" sz="2400" dirty="0"/>
+              <a:t>for content based on a theme/context instead of precise information.</a:t>
+            </a:r>
+          </a:p>
+          <a:p>
+            <a:pPr marL="0" indent="0">
+              <a:buNone/>
+            </a:pPr>
+            <a:endParaRPr lang="en-GB" sz="2400" dirty="0"/>
+          </a:p>
+          <a:p>
+            <a:pPr marL="0" indent="0">
+              <a:buNone/>
+            </a:pPr>
+            <a:endParaRPr lang="en-GB" sz="2400" dirty="0"/>
+          </a:p>
+          <a:p>
+            <a:pPr marL="0" indent="0">
+              <a:buNone/>
+            </a:pPr>
+            <a:endParaRPr lang="en-GB" sz="2400" dirty="0"/>
+          </a:p>
+          <a:p>
+            <a:pPr marL="0" indent="0">
+              <a:buNone/>
+            </a:pPr>
+            <a:endParaRPr lang="en-GB" sz="2400" dirty="0"/>
+          </a:p>
+          <a:p>
+            <a:pPr marL="0" indent="0">
+              <a:buNone/>
+            </a:pPr>
+            <a:endParaRPr lang="en-GB" sz="2400" dirty="0"/>
+          </a:p>
+        </p:txBody>
+      </p:sp>
+      <p:sp>
+        <p:nvSpPr>
+          <p:cNvPr id="3" name="Slide Number Placeholder 2"/>
+          <p:cNvSpPr>
+            <a:spLocks noGrp="1"/>
+          </p:cNvSpPr>
+          <p:nvPr>
+            <p:ph type="sldNum" sz="quarter" idx="12"/>
+          </p:nvPr>
+        </p:nvSpPr>
+        <p:spPr/>
+        <p:txBody>
+          <a:bodyPr/>
+          <a:lstStyle/>
+          <a:p>
+            <a:fld id="{D63D4D68-E5E1-497F-B018-33FA9D88ECA8}" type="slidenum">
+              <a:rPr lang="en-GB" smtClean="0"/>
+              <a:t>20</a:t>
+            </a:fld>
+            <a:endParaRPr lang="en-GB"/>
+          </a:p>
+        </p:txBody>
+      </p:sp>
+    </p:spTree>
+    <p:extLst>
+      <p:ext uri="{BB962C8B-B14F-4D97-AF65-F5344CB8AC3E}">
+        <p14:creationId xmlns:p14="http://schemas.microsoft.com/office/powerpoint/2010/main" val="1118778444"/>
+      </p:ext>
+    </p:extLst>
+  </p:cSld>
+  <p:clrMapOvr>
+    <a:masterClrMapping/>
+  </p:clrMapOvr>
+  <p:timing>
+    <p:tnLst>
+      <p:par>
+        <p:cTn id="1" dur="indefinite" restart="never" nodeType="tmRoot"/>
+      </p:par>
+    </p:tnLst>
+  </p:timing>
+</p:sld>
+</file>
+
+<file path=ppt/slides/slide21.xml><?xml version="1.0" encoding="utf-8"?>
 <p:sld xmlns:a="http://schemas.openxmlformats.org/drawingml/2006/main" xmlns:r="http://schemas.openxmlformats.org/officeDocument/2006/relationships" xmlns:p="http://schemas.openxmlformats.org/presentationml/2006/main">
   <p:cSld>
     <p:spTree>
@@ -13870,7 +14431,7 @@
           <a:p>
             <a:fld id="{D63D4D68-E5E1-497F-B018-33FA9D88ECA8}" type="slidenum">
               <a:rPr lang="en-GB" smtClean="0"/>
-              <a:t>20</a:t>
+              <a:t>21</a:t>
             </a:fld>
             <a:endParaRPr lang="en-GB"/>
           </a:p>
@@ -13896,7 +14457,7 @@
 </p:sld>
 </file>
 
-<file path=ppt/slides/slide21.xml><?xml version="1.0" encoding="utf-8"?>
+<file path=ppt/slides/slide22.xml><?xml version="1.0" encoding="utf-8"?>
 <p:sld xmlns:a="http://schemas.openxmlformats.org/drawingml/2006/main" xmlns:r="http://schemas.openxmlformats.org/officeDocument/2006/relationships" xmlns:p="http://schemas.openxmlformats.org/presentationml/2006/main">
   <p:cSld>
     <p:spTree>
@@ -14881,7 +15442,7 @@
           <a:p>
             <a:fld id="{D63D4D68-E5E1-497F-B018-33FA9D88ECA8}" type="slidenum">
               <a:rPr lang="en-GB" smtClean="0"/>
-              <a:t>21</a:t>
+              <a:t>22</a:t>
             </a:fld>
             <a:endParaRPr lang="en-GB"/>
           </a:p>
@@ -16295,7 +16856,7 @@
 </p:sld>
 </file>
 
-<file path=ppt/slides/slide22.xml><?xml version="1.0" encoding="utf-8"?>
+<file path=ppt/slides/slide23.xml><?xml version="1.0" encoding="utf-8"?>
 <p:sld xmlns:a="http://schemas.openxmlformats.org/drawingml/2006/main" xmlns:r="http://schemas.openxmlformats.org/officeDocument/2006/relationships" xmlns:p="http://schemas.openxmlformats.org/presentationml/2006/main">
   <p:cSld>
     <p:spTree>
@@ -18141,7 +18702,7 @@
           <a:p>
             <a:fld id="{D63D4D68-E5E1-497F-B018-33FA9D88ECA8}" type="slidenum">
               <a:rPr lang="en-GB" smtClean="0"/>
-              <a:t>22</a:t>
+              <a:t>23</a:t>
             </a:fld>
             <a:endParaRPr lang="en-GB"/>
           </a:p>
@@ -21973,7 +22534,7 @@
 </p:sld>
 </file>
 
-<file path=ppt/slides/slide23.xml><?xml version="1.0" encoding="utf-8"?>
+<file path=ppt/slides/slide24.xml><?xml version="1.0" encoding="utf-8"?>
 <p:sld xmlns:a="http://schemas.openxmlformats.org/drawingml/2006/main" xmlns:r="http://schemas.openxmlformats.org/officeDocument/2006/relationships" xmlns:p="http://schemas.openxmlformats.org/presentationml/2006/main">
   <p:cSld>
     <p:spTree>
@@ -22060,9 +22621,42 @@
           <a:p>
             <a:fld id="{D63D4D68-E5E1-497F-B018-33FA9D88ECA8}" type="slidenum">
               <a:rPr lang="en-GB" smtClean="0"/>
-              <a:t>23</a:t>
+              <a:t>24</a:t>
             </a:fld>
             <a:endParaRPr lang="en-GB"/>
+          </a:p>
+        </p:txBody>
+      </p:sp>
+      <p:sp>
+        <p:nvSpPr>
+          <p:cNvPr id="5" name="Content Placeholder 2"/>
+          <p:cNvSpPr>
+            <a:spLocks noGrp="1"/>
+          </p:cNvSpPr>
+          <p:nvPr>
+            <p:ph idx="1"/>
+          </p:nvPr>
+        </p:nvSpPr>
+        <p:spPr>
+          <a:xfrm>
+            <a:off x="1854107" y="6536999"/>
+            <a:ext cx="2152619" cy="368953"/>
+          </a:xfrm>
+        </p:spPr>
+        <p:txBody>
+          <a:bodyPr>
+            <a:normAutofit/>
+          </a:bodyPr>
+          <a:lstStyle/>
+          <a:p>
+            <a:pPr marL="0" indent="0">
+              <a:buNone/>
+            </a:pPr>
+            <a:r>
+              <a:rPr lang="en-US" sz="1100" dirty="0" smtClean="0"/>
+              <a:t>(Burel et al., 2017)</a:t>
+            </a:r>
+            <a:endParaRPr lang="en-US" sz="1100" dirty="0" smtClean="0"/>
           </a:p>
         </p:txBody>
       </p:sp>
@@ -22070,87 +22664,6 @@
     <p:extLst>
       <p:ext uri="{BB962C8B-B14F-4D97-AF65-F5344CB8AC3E}">
         <p14:creationId xmlns:p14="http://schemas.microsoft.com/office/powerpoint/2010/main" val="587328629"/>
-      </p:ext>
-    </p:extLst>
-  </p:cSld>
-  <p:clrMapOvr>
-    <a:masterClrMapping/>
-  </p:clrMapOvr>
-  <p:timing>
-    <p:tnLst>
-      <p:par>
-        <p:cTn id="1" dur="indefinite" restart="never" nodeType="tmRoot"/>
-      </p:par>
-    </p:tnLst>
-  </p:timing>
-</p:sld>
-</file>
-
-<file path=ppt/slides/slide24.xml><?xml version="1.0" encoding="utf-8"?>
-<p:sld xmlns:a="http://schemas.openxmlformats.org/drawingml/2006/main" xmlns:r="http://schemas.openxmlformats.org/officeDocument/2006/relationships" xmlns:p="http://schemas.openxmlformats.org/presentationml/2006/main">
-  <p:cSld>
-    <p:spTree>
-      <p:nvGrpSpPr>
-        <p:cNvPr id="1" name=""/>
-        <p:cNvGrpSpPr/>
-        <p:nvPr/>
-      </p:nvGrpSpPr>
-      <p:grpSpPr>
-        <a:xfrm>
-          <a:off x="0" y="0"/>
-          <a:ext cx="0" cy="0"/>
-          <a:chOff x="0" y="0"/>
-          <a:chExt cx="0" cy="0"/>
-        </a:xfrm>
-      </p:grpSpPr>
-      <p:sp>
-        <p:nvSpPr>
-          <p:cNvPr id="2" name="Title 1"/>
-          <p:cNvSpPr>
-            <a:spLocks noGrp="1"/>
-          </p:cNvSpPr>
-          <p:nvPr>
-            <p:ph type="ctrTitle"/>
-          </p:nvPr>
-        </p:nvSpPr>
-        <p:spPr/>
-        <p:txBody>
-          <a:bodyPr/>
-          <a:lstStyle/>
-          <a:p>
-            <a:r>
-              <a:rPr lang="en-GB" dirty="0"/>
-              <a:t>Automatic Data Collection on Twitter</a:t>
-            </a:r>
-          </a:p>
-        </p:txBody>
-      </p:sp>
-      <p:sp>
-        <p:nvSpPr>
-          <p:cNvPr id="3" name="Subtitle 2"/>
-          <p:cNvSpPr>
-            <a:spLocks noGrp="1"/>
-          </p:cNvSpPr>
-          <p:nvPr>
-            <p:ph type="subTitle" idx="1"/>
-          </p:nvPr>
-        </p:nvSpPr>
-        <p:spPr/>
-        <p:txBody>
-          <a:bodyPr/>
-          <a:lstStyle/>
-          <a:p>
-            <a:r>
-              <a:rPr lang="en-GB" dirty="0"/>
-              <a:t>Hands-on</a:t>
-            </a:r>
-          </a:p>
-        </p:txBody>
-      </p:sp>
-    </p:spTree>
-    <p:extLst>
-      <p:ext uri="{BB962C8B-B14F-4D97-AF65-F5344CB8AC3E}">
-        <p14:creationId xmlns:p14="http://schemas.microsoft.com/office/powerpoint/2010/main" val="3040686935"/>
       </p:ext>
     </p:extLst>
   </p:cSld>
@@ -22191,6 +22704,87 @@
             <a:spLocks noGrp="1"/>
           </p:cNvSpPr>
           <p:nvPr>
+            <p:ph type="ctrTitle"/>
+          </p:nvPr>
+        </p:nvSpPr>
+        <p:spPr/>
+        <p:txBody>
+          <a:bodyPr/>
+          <a:lstStyle/>
+          <a:p>
+            <a:r>
+              <a:rPr lang="en-GB" dirty="0"/>
+              <a:t>Automatic Data Collection on Twitter</a:t>
+            </a:r>
+          </a:p>
+        </p:txBody>
+      </p:sp>
+      <p:sp>
+        <p:nvSpPr>
+          <p:cNvPr id="3" name="Subtitle 2"/>
+          <p:cNvSpPr>
+            <a:spLocks noGrp="1"/>
+          </p:cNvSpPr>
+          <p:nvPr>
+            <p:ph type="subTitle" idx="1"/>
+          </p:nvPr>
+        </p:nvSpPr>
+        <p:spPr/>
+        <p:txBody>
+          <a:bodyPr/>
+          <a:lstStyle/>
+          <a:p>
+            <a:r>
+              <a:rPr lang="en-GB" dirty="0"/>
+              <a:t>Hands-on</a:t>
+            </a:r>
+          </a:p>
+        </p:txBody>
+      </p:sp>
+    </p:spTree>
+    <p:extLst>
+      <p:ext uri="{BB962C8B-B14F-4D97-AF65-F5344CB8AC3E}">
+        <p14:creationId xmlns:p14="http://schemas.microsoft.com/office/powerpoint/2010/main" val="3040686935"/>
+      </p:ext>
+    </p:extLst>
+  </p:cSld>
+  <p:clrMapOvr>
+    <a:masterClrMapping/>
+  </p:clrMapOvr>
+  <p:timing>
+    <p:tnLst>
+      <p:par>
+        <p:cTn id="1" dur="indefinite" restart="never" nodeType="tmRoot"/>
+      </p:par>
+    </p:tnLst>
+  </p:timing>
+</p:sld>
+</file>
+
+<file path=ppt/slides/slide26.xml><?xml version="1.0" encoding="utf-8"?>
+<p:sld xmlns:a="http://schemas.openxmlformats.org/drawingml/2006/main" xmlns:r="http://schemas.openxmlformats.org/officeDocument/2006/relationships" xmlns:p="http://schemas.openxmlformats.org/presentationml/2006/main">
+  <p:cSld>
+    <p:spTree>
+      <p:nvGrpSpPr>
+        <p:cNvPr id="1" name=""/>
+        <p:cNvGrpSpPr/>
+        <p:nvPr/>
+      </p:nvGrpSpPr>
+      <p:grpSpPr>
+        <a:xfrm>
+          <a:off x="0" y="0"/>
+          <a:ext cx="0" cy="0"/>
+          <a:chOff x="0" y="0"/>
+          <a:chExt cx="0" cy="0"/>
+        </a:xfrm>
+      </p:grpSpPr>
+      <p:sp>
+        <p:nvSpPr>
+          <p:cNvPr id="2" name="Title 1"/>
+          <p:cNvSpPr>
+            <a:spLocks noGrp="1"/>
+          </p:cNvSpPr>
+          <p:nvPr>
             <p:ph type="title"/>
           </p:nvPr>
         </p:nvSpPr>
@@ -22360,7 +22954,7 @@
           <a:p>
             <a:fld id="{D63D4D68-E5E1-497F-B018-33FA9D88ECA8}" type="slidenum">
               <a:rPr lang="en-GB" smtClean="0"/>
-              <a:t>25</a:t>
+              <a:t>26</a:t>
             </a:fld>
             <a:endParaRPr lang="en-GB"/>
           </a:p>
@@ -22921,42 +23515,42 @@
                 <a:gridCol w="2914649">
                   <a:extLst>
                     <a:ext uri="{9D8B030D-6E8A-4147-A177-3AD203B41FA5}">
-                      <a16:colId xmlns:a16="http://schemas.microsoft.com/office/drawing/2014/main" xmlns="" val="20000"/>
+                      <a16:colId xmlns="" xmlns:a16="http://schemas.microsoft.com/office/drawing/2014/main" val="20000"/>
                     </a:ext>
                   </a:extLst>
                 </a:gridCol>
                 <a:gridCol w="1212397">
                   <a:extLst>
                     <a:ext uri="{9D8B030D-6E8A-4147-A177-3AD203B41FA5}">
-                      <a16:colId xmlns:a16="http://schemas.microsoft.com/office/drawing/2014/main" xmlns="" val="20001"/>
+                      <a16:colId xmlns="" xmlns:a16="http://schemas.microsoft.com/office/drawing/2014/main" val="20001"/>
                     </a:ext>
                   </a:extLst>
                 </a:gridCol>
                 <a:gridCol w="1255836">
                   <a:extLst>
                     <a:ext uri="{9D8B030D-6E8A-4147-A177-3AD203B41FA5}">
-                      <a16:colId xmlns:a16="http://schemas.microsoft.com/office/drawing/2014/main" xmlns="" val="20002"/>
+                      <a16:colId xmlns="" xmlns:a16="http://schemas.microsoft.com/office/drawing/2014/main" val="20002"/>
                     </a:ext>
                   </a:extLst>
                 </a:gridCol>
                 <a:gridCol w="944593">
                   <a:extLst>
                     <a:ext uri="{9D8B030D-6E8A-4147-A177-3AD203B41FA5}">
-                      <a16:colId xmlns:a16="http://schemas.microsoft.com/office/drawing/2014/main" xmlns="" val="20003"/>
+                      <a16:colId xmlns="" xmlns:a16="http://schemas.microsoft.com/office/drawing/2014/main" val="20003"/>
                     </a:ext>
                   </a:extLst>
                 </a:gridCol>
                 <a:gridCol w="1863306">
                   <a:extLst>
                     <a:ext uri="{9D8B030D-6E8A-4147-A177-3AD203B41FA5}">
-                      <a16:colId xmlns:a16="http://schemas.microsoft.com/office/drawing/2014/main" xmlns="" val="20004"/>
+                      <a16:colId xmlns="" xmlns:a16="http://schemas.microsoft.com/office/drawing/2014/main" val="20004"/>
                     </a:ext>
                   </a:extLst>
                 </a:gridCol>
                 <a:gridCol w="969547">
                   <a:extLst>
                     <a:ext uri="{9D8B030D-6E8A-4147-A177-3AD203B41FA5}">
-                      <a16:colId xmlns:a16="http://schemas.microsoft.com/office/drawing/2014/main" xmlns="" val="20005"/>
+                      <a16:colId xmlns="" xmlns:a16="http://schemas.microsoft.com/office/drawing/2014/main" val="20005"/>
                     </a:ext>
                   </a:extLst>
                 </a:gridCol>
@@ -23042,7 +23636,7 @@
                 </a:tc>
                 <a:extLst>
                   <a:ext uri="{0D108BD9-81ED-4DB2-BD59-A6C34878D82A}">
-                    <a16:rowId xmlns:a16="http://schemas.microsoft.com/office/drawing/2014/main" xmlns="" val="10000"/>
+                    <a16:rowId xmlns="" xmlns:a16="http://schemas.microsoft.com/office/drawing/2014/main" val="10000"/>
                   </a:ext>
                 </a:extLst>
               </a:tr>
@@ -23127,7 +23721,7 @@
                 </a:tc>
                 <a:extLst>
                   <a:ext uri="{0D108BD9-81ED-4DB2-BD59-A6C34878D82A}">
-                    <a16:rowId xmlns:a16="http://schemas.microsoft.com/office/drawing/2014/main" xmlns="" val="10001"/>
+                    <a16:rowId xmlns="" xmlns:a16="http://schemas.microsoft.com/office/drawing/2014/main" val="10001"/>
                   </a:ext>
                 </a:extLst>
               </a:tr>
@@ -23212,7 +23806,7 @@
                 </a:tc>
                 <a:extLst>
                   <a:ext uri="{0D108BD9-81ED-4DB2-BD59-A6C34878D82A}">
-                    <a16:rowId xmlns:a16="http://schemas.microsoft.com/office/drawing/2014/main" xmlns="" val="10002"/>
+                    <a16:rowId xmlns="" xmlns:a16="http://schemas.microsoft.com/office/drawing/2014/main" val="10002"/>
                   </a:ext>
                 </a:extLst>
               </a:tr>
@@ -23297,7 +23891,7 @@
                 </a:tc>
                 <a:extLst>
                   <a:ext uri="{0D108BD9-81ED-4DB2-BD59-A6C34878D82A}">
-                    <a16:rowId xmlns:a16="http://schemas.microsoft.com/office/drawing/2014/main" xmlns="" val="10003"/>
+                    <a16:rowId xmlns="" xmlns:a16="http://schemas.microsoft.com/office/drawing/2014/main" val="10003"/>
                   </a:ext>
                 </a:extLst>
               </a:tr>
@@ -23387,7 +23981,7 @@
                 </a:tc>
                 <a:extLst>
                   <a:ext uri="{0D108BD9-81ED-4DB2-BD59-A6C34878D82A}">
-                    <a16:rowId xmlns:a16="http://schemas.microsoft.com/office/drawing/2014/main" xmlns="" val="10004"/>
+                    <a16:rowId xmlns="" xmlns:a16="http://schemas.microsoft.com/office/drawing/2014/main" val="10004"/>
                   </a:ext>
                 </a:extLst>
               </a:tr>
@@ -23472,7 +24066,7 @@
                 </a:tc>
                 <a:extLst>
                   <a:ext uri="{0D108BD9-81ED-4DB2-BD59-A6C34878D82A}">
-                    <a16:rowId xmlns:a16="http://schemas.microsoft.com/office/drawing/2014/main" xmlns="" val="10005"/>
+                    <a16:rowId xmlns="" xmlns:a16="http://schemas.microsoft.com/office/drawing/2014/main" val="10005"/>
                   </a:ext>
                 </a:extLst>
               </a:tr>
@@ -23557,7 +24151,7 @@
                 </a:tc>
                 <a:extLst>
                   <a:ext uri="{0D108BD9-81ED-4DB2-BD59-A6C34878D82A}">
-                    <a16:rowId xmlns:a16="http://schemas.microsoft.com/office/drawing/2014/main" xmlns="" val="10006"/>
+                    <a16:rowId xmlns="" xmlns:a16="http://schemas.microsoft.com/office/drawing/2014/main" val="10006"/>
                   </a:ext>
                 </a:extLst>
               </a:tr>
@@ -23642,7 +24236,7 @@
                 </a:tc>
                 <a:extLst>
                   <a:ext uri="{0D108BD9-81ED-4DB2-BD59-A6C34878D82A}">
-                    <a16:rowId xmlns:a16="http://schemas.microsoft.com/office/drawing/2014/main" xmlns="" val="10007"/>
+                    <a16:rowId xmlns="" xmlns:a16="http://schemas.microsoft.com/office/drawing/2014/main" val="10007"/>
                   </a:ext>
                 </a:extLst>
               </a:tr>
@@ -23727,7 +24321,7 @@
                 </a:tc>
                 <a:extLst>
                   <a:ext uri="{0D108BD9-81ED-4DB2-BD59-A6C34878D82A}">
-                    <a16:rowId xmlns:a16="http://schemas.microsoft.com/office/drawing/2014/main" xmlns="" val="10008"/>
+                    <a16:rowId xmlns="" xmlns:a16="http://schemas.microsoft.com/office/drawing/2014/main" val="10008"/>
                   </a:ext>
                 </a:extLst>
               </a:tr>

</xml_diff>